<commit_message>
PRESENTATION WITH UPDTED RESULTS
</commit_message>
<xml_diff>
--- a/3D Gaussian Splatting via Masking Dynamic Objects.pptx
+++ b/3D Gaussian Splatting via Masking Dynamic Objects.pptx
@@ -18,9 +18,9 @@
     <p:sldId id="257" r:id="rId9"/>
     <p:sldId id="265" r:id="rId10"/>
     <p:sldId id="260" r:id="rId11"/>
-    <p:sldId id="261" r:id="rId12"/>
-    <p:sldId id="262" r:id="rId13"/>
-    <p:sldId id="269" r:id="rId14"/>
+    <p:sldId id="270" r:id="rId12"/>
+    <p:sldId id="261" r:id="rId13"/>
+    <p:sldId id="262" r:id="rId14"/>
     <p:sldId id="263" r:id="rId15"/>
   </p:sldIdLst>
   <p:sldSz cx="12188825" cy="6858000"/>
@@ -489,6 +489,1285 @@
 </file>
 
 <file path=ppt/notesSlides/notesSlide1.xml><?xml version="1.0" encoding="utf-8"?>
+<p:notes xmlns:a="http://schemas.openxmlformats.org/drawingml/2006/main" xmlns:r="http://schemas.openxmlformats.org/officeDocument/2006/relationships" xmlns:p="http://schemas.openxmlformats.org/presentationml/2006/main">
+  <p:cSld>
+    <p:spTree>
+      <p:nvGrpSpPr>
+        <p:cNvPr id="1" name=""/>
+        <p:cNvGrpSpPr/>
+        <p:nvPr/>
+      </p:nvGrpSpPr>
+      <p:grpSpPr>
+        <a:xfrm>
+          <a:off x="0" y="0"/>
+          <a:ext cx="0" cy="0"/>
+          <a:chOff x="0" y="0"/>
+          <a:chExt cx="0" cy="0"/>
+        </a:xfrm>
+      </p:grpSpPr>
+      <p:sp>
+        <p:nvSpPr>
+          <p:cNvPr id="2" name="Slide Image Placeholder 1"/>
+          <p:cNvSpPr>
+            <a:spLocks noGrp="1" noRot="1" noChangeAspect="1"/>
+          </p:cNvSpPr>
+          <p:nvPr>
+            <p:ph type="sldImg"/>
+          </p:nvPr>
+        </p:nvSpPr>
+        <p:spPr/>
+      </p:sp>
+      <mc:AlternateContent xmlns:mc="http://schemas.openxmlformats.org/markup-compatibility/2006" xmlns:a14="http://schemas.microsoft.com/office/drawing/2010/main">
+        <mc:Choice Requires="a14">
+          <p:sp>
+            <p:nvSpPr>
+              <p:cNvPr id="3" name="Notes Placeholder 2"/>
+              <p:cNvSpPr>
+                <a:spLocks noGrp="1"/>
+              </p:cNvSpPr>
+              <p:nvPr>
+                <p:ph type="body" idx="1"/>
+              </p:nvPr>
+            </p:nvSpPr>
+            <p:spPr/>
+            <p:txBody>
+              <a:bodyPr/>
+              <a:lstStyle/>
+              <a:p>
+                <a:r>
+                  <a:rPr lang="en-US" b="1" dirty="0"/>
+                  <a:t>PSNR</a:t>
+                </a:r>
+                <a:r>
+                  <a:rPr lang="en-US" dirty="0"/>
+                  <a:t>_DEF: </a:t>
+                </a:r>
+                <a:r>
+                  <a:rPr lang="en-US" sz="1200" dirty="0"/>
+                  <a:t>L = maximum possible pixel value of the image (e.g., 1.0 if normalized, 255 if 8-bit)</a:t>
+                </a:r>
+              </a:p>
+              <a:p>
+                <a:r>
+                  <a:rPr lang="en-US" sz="1200" b="1" dirty="0"/>
+                  <a:t>MSE</a:t>
+                </a:r>
+                <a:r>
+                  <a:rPr lang="en-US" sz="1200" dirty="0"/>
+                  <a:t>=BTW predicted and ground truth images:</a:t>
+                </a:r>
+              </a:p>
+              <a:p>
+                <a:endParaRPr lang="en-US" sz="1200" dirty="0"/>
+              </a:p>
+              <a:p>
+                <a:r>
+                  <a:rPr lang="en-US" b="1" dirty="0"/>
+                  <a:t>SSIM_DEF</a:t>
+                </a:r>
+                <a:r>
+                  <a:rPr lang="en-US" dirty="0"/>
+                  <a:t>: </a:t>
+                </a:r>
+                <a:r>
+                  <a:rPr lang="en-US" sz="1200" b="1" dirty="0"/>
+                  <a:t>x, y </a:t>
+                </a:r>
+                <a:r>
+                  <a:rPr lang="en-US" sz="1200" dirty="0"/>
+                  <a:t>= local patches of predicted and ground truth images</a:t>
+                </a:r>
+              </a:p>
+              <a:p>
+                <a:r>
+                  <a:rPr lang="en-US" sz="1200" b="1" dirty="0" err="1"/>
+                  <a:t>μx</a:t>
+                </a:r>
+                <a:r>
+                  <a:rPr lang="en-US" sz="1200" b="1" dirty="0"/>
+                  <a:t>​, </a:t>
+                </a:r>
+                <a:r>
+                  <a:rPr lang="en-US" sz="1200" b="1" dirty="0" err="1"/>
+                  <a:t>μy</a:t>
+                </a:r>
+                <a:r>
+                  <a:rPr lang="en-US" sz="1200" dirty="0"/>
+                  <a:t>​ = mean intensity of x and y</a:t>
+                </a:r>
+              </a:p>
+              <a:p>
+                <a:r>
+                  <a:rPr lang="en-US" sz="1200" b="1" dirty="0"/>
+                  <a:t>σx2​,σy2</a:t>
+                </a:r>
+                <a:r>
+                  <a:rPr lang="en-US" sz="1200" dirty="0"/>
+                  <a:t>​ = variance of x and y</a:t>
+                </a:r>
+              </a:p>
+              <a:p>
+                <a:r>
+                  <a:rPr lang="en-US" sz="1200" b="1" dirty="0" err="1"/>
+                  <a:t>σxy</a:t>
+                </a:r>
+                <a:r>
+                  <a:rPr lang="en-US" sz="1200" dirty="0"/>
+                  <a:t>​ = covariance between x and y</a:t>
+                </a:r>
+              </a:p>
+              <a:p>
+                <a:endParaRPr lang="en-US" sz="1200" dirty="0"/>
+              </a:p>
+              <a:p>
+                <a:r>
+                  <a:rPr lang="en-US" sz="1200" dirty="0"/>
+                  <a:t>Others= Stabilization constants</a:t>
+                </a:r>
+              </a:p>
+              <a:p>
+                <a:endParaRPr lang="en-US" sz="1200" dirty="0"/>
+              </a:p>
+              <a:p>
+                <a:r>
+                  <a:rPr lang="en-US" b="1" dirty="0"/>
+                  <a:t>LPIPS_DEF</a:t>
+                </a:r>
+                <a:r>
+                  <a:rPr lang="en-US" dirty="0"/>
+                  <a:t>: </a:t>
+                </a:r>
+                <a:r>
+                  <a:rPr lang="en-US" sz="1200" i="1" dirty="0"/>
+                  <a:t>x, y </a:t>
+                </a:r>
+                <a:r>
+                  <a:rPr lang="en-US" sz="1200" dirty="0"/>
+                  <a:t>= images</a:t>
+                </a:r>
+              </a:p>
+              <a:p>
+                <a:pPr/>
+                <a14:m>
+                  <m:oMathPara xmlns:m="http://schemas.openxmlformats.org/officeDocument/2006/math">
+                    <m:oMathParaPr>
+                      <m:jc m:val="centerGroup"/>
+                    </m:oMathParaPr>
+                    <m:oMath xmlns:m="http://schemas.openxmlformats.org/officeDocument/2006/math">
+                      <m:sSup>
+                        <m:sSupPr>
+                          <m:ctrlPr>
+                            <a:rPr lang="en-US" sz="1200" i="1">
+                              <a:latin typeface="Cambria Math" panose="02040503050406030204" pitchFamily="18" charset="0"/>
+                            </a:rPr>
+                          </m:ctrlPr>
+                        </m:sSupPr>
+                        <m:e>
+                          <m:acc>
+                            <m:accPr>
+                              <m:chr m:val="̂"/>
+                              <m:ctrlPr>
+                                <a:rPr lang="en-US" sz="1200" i="1">
+                                  <a:latin typeface="Cambria Math" panose="02040503050406030204" pitchFamily="18" charset="0"/>
+                                </a:rPr>
+                              </m:ctrlPr>
+                            </m:accPr>
+                            <m:e>
+                              <m:r>
+                                <a:rPr lang="en-US" sz="1200" i="1">
+                                  <a:latin typeface="Cambria Math" panose="02040503050406030204" pitchFamily="18" charset="0"/>
+                                </a:rPr>
+                                <m:t>𝑥</m:t>
+                              </m:r>
+                            </m:e>
+                          </m:acc>
+                        </m:e>
+                        <m:sup>
+                          <m:r>
+                            <a:rPr lang="en-US" sz="1200" i="1">
+                              <a:latin typeface="Cambria Math" panose="02040503050406030204" pitchFamily="18" charset="0"/>
+                            </a:rPr>
+                            <m:t>𝑙</m:t>
+                          </m:r>
+                        </m:sup>
+                      </m:sSup>
+                      <m:r>
+                        <a:rPr lang="en-US" sz="1200" i="1">
+                          <a:latin typeface="Cambria Math" panose="02040503050406030204" pitchFamily="18" charset="0"/>
+                        </a:rPr>
+                        <m:t>, </m:t>
+                      </m:r>
+                      <m:sSup>
+                        <m:sSupPr>
+                          <m:ctrlPr>
+                            <a:rPr lang="en-US" sz="1200" i="1">
+                              <a:latin typeface="Cambria Math" panose="02040503050406030204" pitchFamily="18" charset="0"/>
+                            </a:rPr>
+                          </m:ctrlPr>
+                        </m:sSupPr>
+                        <m:e>
+                          <m:acc>
+                            <m:accPr>
+                              <m:chr m:val="̂"/>
+                              <m:ctrlPr>
+                                <a:rPr lang="en-US" sz="1200" i="1">
+                                  <a:latin typeface="Cambria Math" panose="02040503050406030204" pitchFamily="18" charset="0"/>
+                                </a:rPr>
+                              </m:ctrlPr>
+                            </m:accPr>
+                            <m:e>
+                              <m:r>
+                                <a:rPr lang="en-US" sz="1200" i="1">
+                                  <a:latin typeface="Cambria Math" panose="02040503050406030204" pitchFamily="18" charset="0"/>
+                                </a:rPr>
+                                <m:t>𝑦</m:t>
+                              </m:r>
+                            </m:e>
+                          </m:acc>
+                        </m:e>
+                        <m:sup>
+                          <m:r>
+                            <a:rPr lang="en-US" sz="1200" i="1">
+                              <a:latin typeface="Cambria Math" panose="02040503050406030204" pitchFamily="18" charset="0"/>
+                            </a:rPr>
+                            <m:t>𝑙</m:t>
+                          </m:r>
+                        </m:sup>
+                      </m:sSup>
+                      <m:r>
+                        <a:rPr lang="en-US" sz="1200" b="0" i="1" smtClean="0">
+                          <a:latin typeface="Cambria Math" panose="02040503050406030204" pitchFamily="18" charset="0"/>
+                        </a:rPr>
+                        <m:t>:</m:t>
+                      </m:r>
+                      <m:r>
+                        <m:rPr>
+                          <m:sty m:val="p"/>
+                        </m:rPr>
+                        <a:rPr lang="en-US" sz="1200">
+                          <a:latin typeface="Cambria Math" panose="02040503050406030204" pitchFamily="18" charset="0"/>
+                        </a:rPr>
+                        <m:t>feature</m:t>
+                      </m:r>
+                      <m:r>
+                        <a:rPr lang="en-US" sz="1200">
+                          <a:latin typeface="Cambria Math" panose="02040503050406030204" pitchFamily="18" charset="0"/>
+                        </a:rPr>
+                        <m:t> </m:t>
+                      </m:r>
+                      <m:r>
+                        <m:rPr>
+                          <m:sty m:val="p"/>
+                        </m:rPr>
+                        <a:rPr lang="en-US" sz="1200">
+                          <a:latin typeface="Cambria Math" panose="02040503050406030204" pitchFamily="18" charset="0"/>
+                        </a:rPr>
+                        <m:t>activations</m:t>
+                      </m:r>
+                      <m:r>
+                        <a:rPr lang="en-US" sz="1200">
+                          <a:latin typeface="Cambria Math" panose="02040503050406030204" pitchFamily="18" charset="0"/>
+                        </a:rPr>
+                        <m:t> </m:t>
+                      </m:r>
+                      <m:r>
+                        <m:rPr>
+                          <m:sty m:val="p"/>
+                        </m:rPr>
+                        <a:rPr lang="en-US" sz="1200">
+                          <a:latin typeface="Cambria Math" panose="02040503050406030204" pitchFamily="18" charset="0"/>
+                        </a:rPr>
+                        <m:t>of</m:t>
+                      </m:r>
+                      <m:r>
+                        <a:rPr lang="en-US" sz="1200">
+                          <a:latin typeface="Cambria Math" panose="02040503050406030204" pitchFamily="18" charset="0"/>
+                        </a:rPr>
+                        <m:t> </m:t>
+                      </m:r>
+                      <m:r>
+                        <m:rPr>
+                          <m:sty m:val="p"/>
+                        </m:rPr>
+                        <a:rPr lang="en-US" sz="1200">
+                          <a:latin typeface="Cambria Math" panose="02040503050406030204" pitchFamily="18" charset="0"/>
+                        </a:rPr>
+                        <m:t>a</m:t>
+                      </m:r>
+                      <m:r>
+                        <a:rPr lang="en-US" sz="1200">
+                          <a:latin typeface="Cambria Math" panose="02040503050406030204" pitchFamily="18" charset="0"/>
+                        </a:rPr>
+                        <m:t> </m:t>
+                      </m:r>
+                      <m:r>
+                        <m:rPr>
+                          <m:sty m:val="p"/>
+                        </m:rPr>
+                        <a:rPr lang="en-US" sz="1200">
+                          <a:latin typeface="Cambria Math" panose="02040503050406030204" pitchFamily="18" charset="0"/>
+                        </a:rPr>
+                        <m:t>pretrained</m:t>
+                      </m:r>
+                      <m:r>
+                        <a:rPr lang="en-US" sz="1200">
+                          <a:latin typeface="Cambria Math" panose="02040503050406030204" pitchFamily="18" charset="0"/>
+                        </a:rPr>
+                        <m:t> </m:t>
+                      </m:r>
+                      <m:r>
+                        <m:rPr>
+                          <m:sty m:val="p"/>
+                        </m:rPr>
+                        <a:rPr lang="en-US" sz="1200">
+                          <a:latin typeface="Cambria Math" panose="02040503050406030204" pitchFamily="18" charset="0"/>
+                        </a:rPr>
+                        <m:t>network</m:t>
+                      </m:r>
+                      <m:r>
+                        <a:rPr lang="en-US" sz="1200">
+                          <a:latin typeface="Cambria Math" panose="02040503050406030204" pitchFamily="18" charset="0"/>
+                        </a:rPr>
+                        <m:t> (</m:t>
+                      </m:r>
+                      <m:r>
+                        <m:rPr>
+                          <m:sty m:val="p"/>
+                        </m:rPr>
+                        <a:rPr lang="en-US" sz="1200">
+                          <a:latin typeface="Cambria Math" panose="02040503050406030204" pitchFamily="18" charset="0"/>
+                        </a:rPr>
+                        <m:t>e</m:t>
+                      </m:r>
+                      <m:r>
+                        <a:rPr lang="en-US" sz="1200">
+                          <a:latin typeface="Cambria Math" panose="02040503050406030204" pitchFamily="18" charset="0"/>
+                        </a:rPr>
+                        <m:t>.</m:t>
+                      </m:r>
+                      <m:r>
+                        <m:rPr>
+                          <m:sty m:val="p"/>
+                        </m:rPr>
+                        <a:rPr lang="en-US" sz="1200">
+                          <a:latin typeface="Cambria Math" panose="02040503050406030204" pitchFamily="18" charset="0"/>
+                        </a:rPr>
+                        <m:t>g</m:t>
+                      </m:r>
+                      <m:r>
+                        <a:rPr lang="en-US" sz="1200">
+                          <a:latin typeface="Cambria Math" panose="02040503050406030204" pitchFamily="18" charset="0"/>
+                        </a:rPr>
+                        <m:t>., </m:t>
+                      </m:r>
+                      <m:r>
+                        <m:rPr>
+                          <m:sty m:val="p"/>
+                        </m:rPr>
+                        <a:rPr lang="en-US" sz="1200">
+                          <a:latin typeface="Cambria Math" panose="02040503050406030204" pitchFamily="18" charset="0"/>
+                        </a:rPr>
+                        <m:t>AlexNet</m:t>
+                      </m:r>
+                      <m:r>
+                        <a:rPr lang="en-US" sz="1200">
+                          <a:latin typeface="Cambria Math" panose="02040503050406030204" pitchFamily="18" charset="0"/>
+                        </a:rPr>
+                        <m:t>, </m:t>
+                      </m:r>
+                      <m:r>
+                        <m:rPr>
+                          <m:sty m:val="p"/>
+                        </m:rPr>
+                        <a:rPr lang="en-US" sz="1200">
+                          <a:latin typeface="Cambria Math" panose="02040503050406030204" pitchFamily="18" charset="0"/>
+                        </a:rPr>
+                        <m:t>VGG</m:t>
+                      </m:r>
+                      <m:r>
+                        <a:rPr lang="en-US" sz="1200">
+                          <a:latin typeface="Cambria Math" panose="02040503050406030204" pitchFamily="18" charset="0"/>
+                        </a:rPr>
+                        <m:t>) </m:t>
+                      </m:r>
+                      <m:r>
+                        <m:rPr>
+                          <m:sty m:val="p"/>
+                        </m:rPr>
+                        <a:rPr lang="en-US" sz="1200">
+                          <a:latin typeface="Cambria Math" panose="02040503050406030204" pitchFamily="18" charset="0"/>
+                        </a:rPr>
+                        <m:t>at</m:t>
+                      </m:r>
+                      <m:r>
+                        <a:rPr lang="en-US" sz="1200">
+                          <a:latin typeface="Cambria Math" panose="02040503050406030204" pitchFamily="18" charset="0"/>
+                        </a:rPr>
+                        <m:t> </m:t>
+                      </m:r>
+                      <m:r>
+                        <m:rPr>
+                          <m:sty m:val="p"/>
+                        </m:rPr>
+                        <a:rPr lang="en-US" sz="1200">
+                          <a:latin typeface="Cambria Math" panose="02040503050406030204" pitchFamily="18" charset="0"/>
+                        </a:rPr>
+                        <m:t>layer</m:t>
+                      </m:r>
+                      <m:r>
+                        <a:rPr lang="en-US" sz="1200" i="1">
+                          <a:latin typeface="Cambria Math" panose="02040503050406030204" pitchFamily="18" charset="0"/>
+                        </a:rPr>
+                        <m:t> </m:t>
+                      </m:r>
+                      <m:r>
+                        <a:rPr lang="en-US" sz="1200" i="1">
+                          <a:latin typeface="Cambria Math" panose="02040503050406030204" pitchFamily="18" charset="0"/>
+                        </a:rPr>
+                        <m:t>𝑙</m:t>
+                      </m:r>
+                    </m:oMath>
+                  </m:oMathPara>
+                </a14:m>
+                <a:endParaRPr lang="en-US" sz="1200" dirty="0"/>
+              </a:p>
+              <a:p>
+                <a:pPr/>
+                <a14:m>
+                  <m:oMathPara xmlns:m="http://schemas.openxmlformats.org/officeDocument/2006/math">
+                    <m:oMathParaPr>
+                      <m:jc m:val="centerGroup"/>
+                    </m:oMathParaPr>
+                    <m:oMath xmlns:m="http://schemas.openxmlformats.org/officeDocument/2006/math">
+                      <m:sSub>
+                        <m:sSubPr>
+                          <m:ctrlPr>
+                            <a:rPr lang="en-US" sz="1200" i="1">
+                              <a:latin typeface="Cambria Math" panose="02040503050406030204" pitchFamily="18" charset="0"/>
+                            </a:rPr>
+                          </m:ctrlPr>
+                        </m:sSubPr>
+                        <m:e>
+                          <m:r>
+                            <a:rPr lang="en-US" sz="1200" i="1">
+                              <a:latin typeface="Cambria Math" panose="02040503050406030204" pitchFamily="18" charset="0"/>
+                            </a:rPr>
+                            <m:t>𝑤</m:t>
+                          </m:r>
+                        </m:e>
+                        <m:sub>
+                          <m:r>
+                            <a:rPr lang="en-US" sz="1200" i="1">
+                              <a:latin typeface="Cambria Math" panose="02040503050406030204" pitchFamily="18" charset="0"/>
+                            </a:rPr>
+                            <m:t>𝑙</m:t>
+                          </m:r>
+                        </m:sub>
+                      </m:sSub>
+                      <m:r>
+                        <a:rPr lang="en-US" sz="1200" i="1">
+                          <a:latin typeface="Cambria Math" panose="02040503050406030204" pitchFamily="18" charset="0"/>
+                        </a:rPr>
+                        <m:t>= </m:t>
+                      </m:r>
+                      <m:r>
+                        <m:rPr>
+                          <m:sty m:val="p"/>
+                        </m:rPr>
+                        <a:rPr lang="en-US" sz="1200">
+                          <a:latin typeface="Cambria Math" panose="02040503050406030204" pitchFamily="18" charset="0"/>
+                        </a:rPr>
+                        <m:t>learned</m:t>
+                      </m:r>
+                      <m:r>
+                        <a:rPr lang="en-US" sz="1200">
+                          <a:latin typeface="Cambria Math" panose="02040503050406030204" pitchFamily="18" charset="0"/>
+                        </a:rPr>
+                        <m:t> </m:t>
+                      </m:r>
+                      <m:r>
+                        <m:rPr>
+                          <m:sty m:val="p"/>
+                        </m:rPr>
+                        <a:rPr lang="en-US" sz="1200">
+                          <a:latin typeface="Cambria Math" panose="02040503050406030204" pitchFamily="18" charset="0"/>
+                        </a:rPr>
+                        <m:t>per</m:t>
+                      </m:r>
+                      <m:r>
+                        <a:rPr lang="en-US" sz="1200" i="1">
+                          <a:latin typeface="Cambria Math" panose="02040503050406030204" pitchFamily="18" charset="0"/>
+                        </a:rPr>
+                        <m:t>−</m:t>
+                      </m:r>
+                      <m:r>
+                        <m:rPr>
+                          <m:sty m:val="p"/>
+                        </m:rPr>
+                        <a:rPr lang="en-US" sz="1200">
+                          <a:latin typeface="Cambria Math" panose="02040503050406030204" pitchFamily="18" charset="0"/>
+                        </a:rPr>
+                        <m:t>channel</m:t>
+                      </m:r>
+                      <m:r>
+                        <a:rPr lang="en-US" sz="1200">
+                          <a:latin typeface="Cambria Math" panose="02040503050406030204" pitchFamily="18" charset="0"/>
+                        </a:rPr>
+                        <m:t> </m:t>
+                      </m:r>
+                      <m:r>
+                        <m:rPr>
+                          <m:sty m:val="p"/>
+                        </m:rPr>
+                        <a:rPr lang="en-US" sz="1200">
+                          <a:latin typeface="Cambria Math" panose="02040503050406030204" pitchFamily="18" charset="0"/>
+                        </a:rPr>
+                        <m:t>weights</m:t>
+                      </m:r>
+                      <m:r>
+                        <a:rPr lang="en-US" sz="1200">
+                          <a:latin typeface="Cambria Math" panose="02040503050406030204" pitchFamily="18" charset="0"/>
+                        </a:rPr>
+                        <m:t> </m:t>
+                      </m:r>
+                      <m:r>
+                        <m:rPr>
+                          <m:sty m:val="p"/>
+                        </m:rPr>
+                        <a:rPr lang="en-US" sz="1200">
+                          <a:latin typeface="Cambria Math" panose="02040503050406030204" pitchFamily="18" charset="0"/>
+                        </a:rPr>
+                        <m:t>for</m:t>
+                      </m:r>
+                      <m:r>
+                        <a:rPr lang="en-US" sz="1200">
+                          <a:latin typeface="Cambria Math" panose="02040503050406030204" pitchFamily="18" charset="0"/>
+                        </a:rPr>
+                        <m:t> </m:t>
+                      </m:r>
+                      <m:r>
+                        <m:rPr>
+                          <m:sty m:val="p"/>
+                        </m:rPr>
+                        <a:rPr lang="en-US" sz="1200">
+                          <a:latin typeface="Cambria Math" panose="02040503050406030204" pitchFamily="18" charset="0"/>
+                        </a:rPr>
+                        <m:t>layer</m:t>
+                      </m:r>
+                      <m:r>
+                        <a:rPr lang="en-US" sz="1200">
+                          <a:latin typeface="Cambria Math" panose="02040503050406030204" pitchFamily="18" charset="0"/>
+                        </a:rPr>
+                        <m:t> </m:t>
+                      </m:r>
+                      <m:r>
+                        <a:rPr lang="en-US" sz="1200" i="1">
+                          <a:latin typeface="Cambria Math" panose="02040503050406030204" pitchFamily="18" charset="0"/>
+                        </a:rPr>
+                        <m:t>𝑙</m:t>
+                      </m:r>
+                    </m:oMath>
+                  </m:oMathPara>
+                </a14:m>
+                <a:endParaRPr lang="en-US" sz="1200" dirty="0"/>
+              </a:p>
+              <a:p>
+                <a:pPr/>
+                <a14:m>
+                  <m:oMathPara xmlns:m="http://schemas.openxmlformats.org/officeDocument/2006/math">
+                    <m:oMathParaPr>
+                      <m:jc m:val="centerGroup"/>
+                    </m:oMathParaPr>
+                    <m:oMath xmlns:m="http://schemas.openxmlformats.org/officeDocument/2006/math">
+                      <m:sSub>
+                        <m:sSubPr>
+                          <m:ctrlPr>
+                            <a:rPr lang="en-US" sz="1200" i="1">
+                              <a:latin typeface="Cambria Math" panose="02040503050406030204" pitchFamily="18" charset="0"/>
+                            </a:rPr>
+                          </m:ctrlPr>
+                        </m:sSubPr>
+                        <m:e>
+                          <m:r>
+                            <a:rPr lang="en-US" sz="1200" i="1">
+                              <a:latin typeface="Cambria Math" panose="02040503050406030204" pitchFamily="18" charset="0"/>
+                            </a:rPr>
+                            <m:t>𝐻</m:t>
+                          </m:r>
+                        </m:e>
+                        <m:sub>
+                          <m:r>
+                            <a:rPr lang="en-US" sz="1200" i="1">
+                              <a:latin typeface="Cambria Math" panose="02040503050406030204" pitchFamily="18" charset="0"/>
+                            </a:rPr>
+                            <m:t>𝑙</m:t>
+                          </m:r>
+                        </m:sub>
+                      </m:sSub>
+                      <m:r>
+                        <a:rPr lang="en-US" sz="1200" i="1">
+                          <a:latin typeface="Cambria Math" panose="02040503050406030204" pitchFamily="18" charset="0"/>
+                        </a:rPr>
+                        <m:t>, </m:t>
+                      </m:r>
+                      <m:sSub>
+                        <m:sSubPr>
+                          <m:ctrlPr>
+                            <a:rPr lang="en-US" sz="1200" i="1">
+                              <a:latin typeface="Cambria Math" panose="02040503050406030204" pitchFamily="18" charset="0"/>
+                            </a:rPr>
+                          </m:ctrlPr>
+                        </m:sSubPr>
+                        <m:e>
+                          <m:r>
+                            <a:rPr lang="en-US" sz="1200" i="1">
+                              <a:latin typeface="Cambria Math" panose="02040503050406030204" pitchFamily="18" charset="0"/>
+                            </a:rPr>
+                            <m:t>𝑊</m:t>
+                          </m:r>
+                        </m:e>
+                        <m:sub>
+                          <m:r>
+                            <a:rPr lang="en-US" sz="1200" i="1">
+                              <a:latin typeface="Cambria Math" panose="02040503050406030204" pitchFamily="18" charset="0"/>
+                            </a:rPr>
+                            <m:t>𝑙</m:t>
+                          </m:r>
+                        </m:sub>
+                      </m:sSub>
+                      <m:r>
+                        <a:rPr lang="en-US" sz="1200" i="1">
+                          <a:latin typeface="Cambria Math" panose="02040503050406030204" pitchFamily="18" charset="0"/>
+                        </a:rPr>
+                        <m:t> = </m:t>
+                      </m:r>
+                      <m:r>
+                        <m:rPr>
+                          <m:sty m:val="p"/>
+                        </m:rPr>
+                        <a:rPr lang="en-US" sz="1200">
+                          <a:latin typeface="Cambria Math" panose="02040503050406030204" pitchFamily="18" charset="0"/>
+                        </a:rPr>
+                        <m:t>spatial</m:t>
+                      </m:r>
+                      <m:r>
+                        <a:rPr lang="en-US" sz="1200">
+                          <a:latin typeface="Cambria Math" panose="02040503050406030204" pitchFamily="18" charset="0"/>
+                        </a:rPr>
+                        <m:t> </m:t>
+                      </m:r>
+                      <m:r>
+                        <m:rPr>
+                          <m:sty m:val="p"/>
+                        </m:rPr>
+                        <a:rPr lang="en-US" sz="1200">
+                          <a:latin typeface="Cambria Math" panose="02040503050406030204" pitchFamily="18" charset="0"/>
+                        </a:rPr>
+                        <m:t>dimensions</m:t>
+                      </m:r>
+                      <m:r>
+                        <a:rPr lang="en-US" sz="1200">
+                          <a:latin typeface="Cambria Math" panose="02040503050406030204" pitchFamily="18" charset="0"/>
+                        </a:rPr>
+                        <m:t> </m:t>
+                      </m:r>
+                      <m:r>
+                        <m:rPr>
+                          <m:sty m:val="p"/>
+                        </m:rPr>
+                        <a:rPr lang="en-US" sz="1200">
+                          <a:latin typeface="Cambria Math" panose="02040503050406030204" pitchFamily="18" charset="0"/>
+                        </a:rPr>
+                        <m:t>of</m:t>
+                      </m:r>
+                      <m:r>
+                        <a:rPr lang="en-US" sz="1200">
+                          <a:latin typeface="Cambria Math" panose="02040503050406030204" pitchFamily="18" charset="0"/>
+                        </a:rPr>
+                        <m:t> </m:t>
+                      </m:r>
+                      <m:r>
+                        <m:rPr>
+                          <m:sty m:val="p"/>
+                        </m:rPr>
+                        <a:rPr lang="en-US" sz="1200">
+                          <a:latin typeface="Cambria Math" panose="02040503050406030204" pitchFamily="18" charset="0"/>
+                        </a:rPr>
+                        <m:t>layer</m:t>
+                      </m:r>
+                      <m:r>
+                        <a:rPr lang="en-US" sz="1200">
+                          <a:latin typeface="Cambria Math" panose="02040503050406030204" pitchFamily="18" charset="0"/>
+                        </a:rPr>
+                        <m:t> </m:t>
+                      </m:r>
+                      <m:r>
+                        <a:rPr lang="en-US" sz="1200" i="1">
+                          <a:latin typeface="Cambria Math" panose="02040503050406030204" pitchFamily="18" charset="0"/>
+                        </a:rPr>
+                        <m:t>𝑙</m:t>
+                      </m:r>
+                    </m:oMath>
+                  </m:oMathPara>
+                </a14:m>
+                <a:endParaRPr lang="en-US" sz="1200" dirty="0"/>
+              </a:p>
+              <a:p>
+                <a:endParaRPr lang="en-US" sz="1200" dirty="0"/>
+              </a:p>
+              <a:p>
+                <a:endParaRPr lang="en-US" dirty="0"/>
+              </a:p>
+            </p:txBody>
+          </p:sp>
+        </mc:Choice>
+        <mc:Fallback xmlns="">
+          <p:sp>
+            <p:nvSpPr>
+              <p:cNvPr id="3" name="Notes Placeholder 2"/>
+              <p:cNvSpPr>
+                <a:spLocks noGrp="1"/>
+              </p:cNvSpPr>
+              <p:nvPr>
+                <p:ph type="body" idx="1"/>
+              </p:nvPr>
+            </p:nvSpPr>
+            <p:spPr/>
+            <p:txBody>
+              <a:bodyPr/>
+              <a:lstStyle/>
+              <a:p>
+                <a:r>
+                  <a:rPr lang="en-US" b="1" dirty="0"/>
+                  <a:t>PSNR</a:t>
+                </a:r>
+                <a:r>
+                  <a:rPr lang="en-US" dirty="0"/>
+                  <a:t>_DEF: </a:t>
+                </a:r>
+                <a:r>
+                  <a:rPr lang="en-US" sz="1200" dirty="0"/>
+                  <a:t>L = maximum possible pixel value of the image (e.g., 1.0 if normalized, 255 if 8-bit)</a:t>
+                </a:r>
+              </a:p>
+              <a:p>
+                <a:r>
+                  <a:rPr lang="en-US" sz="1200" b="1" dirty="0"/>
+                  <a:t>MSE</a:t>
+                </a:r>
+                <a:r>
+                  <a:rPr lang="en-US" sz="1200" dirty="0"/>
+                  <a:t>=BTW predicted and ground truth images:</a:t>
+                </a:r>
+              </a:p>
+              <a:p>
+                <a:endParaRPr lang="en-US" sz="1200" dirty="0"/>
+              </a:p>
+              <a:p>
+                <a:r>
+                  <a:rPr lang="en-US" b="1" dirty="0"/>
+                  <a:t>SSIM_DEF</a:t>
+                </a:r>
+                <a:r>
+                  <a:rPr lang="en-US" dirty="0"/>
+                  <a:t>: </a:t>
+                </a:r>
+                <a:r>
+                  <a:rPr lang="en-US" sz="1200" b="1" dirty="0"/>
+                  <a:t>x, y </a:t>
+                </a:r>
+                <a:r>
+                  <a:rPr lang="en-US" sz="1200" dirty="0"/>
+                  <a:t>= local patches of predicted and ground truth images</a:t>
+                </a:r>
+              </a:p>
+              <a:p>
+                <a:r>
+                  <a:rPr lang="en-US" sz="1200" b="1" dirty="0" err="1"/>
+                  <a:t>μx</a:t>
+                </a:r>
+                <a:r>
+                  <a:rPr lang="en-US" sz="1200" b="1" dirty="0"/>
+                  <a:t>​, </a:t>
+                </a:r>
+                <a:r>
+                  <a:rPr lang="en-US" sz="1200" b="1" dirty="0" err="1"/>
+                  <a:t>μy</a:t>
+                </a:r>
+                <a:r>
+                  <a:rPr lang="en-US" sz="1200" dirty="0"/>
+                  <a:t>​ = mean intensity of x and y</a:t>
+                </a:r>
+              </a:p>
+              <a:p>
+                <a:r>
+                  <a:rPr lang="en-US" sz="1200" b="1" dirty="0"/>
+                  <a:t>σx2​,σy2</a:t>
+                </a:r>
+                <a:r>
+                  <a:rPr lang="en-US" sz="1200" dirty="0"/>
+                  <a:t>​ = variance of x and y</a:t>
+                </a:r>
+              </a:p>
+              <a:p>
+                <a:r>
+                  <a:rPr lang="en-US" sz="1200" b="1" dirty="0" err="1"/>
+                  <a:t>σxy</a:t>
+                </a:r>
+                <a:r>
+                  <a:rPr lang="en-US" sz="1200" dirty="0"/>
+                  <a:t>​ = covariance between x and y</a:t>
+                </a:r>
+              </a:p>
+              <a:p>
+                <a:endParaRPr lang="en-US" sz="1200" dirty="0"/>
+              </a:p>
+              <a:p>
+                <a:r>
+                  <a:rPr lang="en-US" sz="1200" dirty="0"/>
+                  <a:t>Others= Stabilization constants</a:t>
+                </a:r>
+              </a:p>
+              <a:p>
+                <a:endParaRPr lang="en-US" sz="1200" dirty="0"/>
+              </a:p>
+              <a:p>
+                <a:r>
+                  <a:rPr lang="en-US" b="1" dirty="0"/>
+                  <a:t>LPIPS_DEF</a:t>
+                </a:r>
+                <a:r>
+                  <a:rPr lang="en-US" dirty="0"/>
+                  <a:t>: </a:t>
+                </a:r>
+                <a:r>
+                  <a:rPr lang="en-US" sz="1200" i="1" dirty="0"/>
+                  <a:t>x, y </a:t>
+                </a:r>
+                <a:r>
+                  <a:rPr lang="en-US" sz="1200" dirty="0"/>
+                  <a:t>= images</a:t>
+                </a:r>
+              </a:p>
+              <a:p>
+                <a:r>
+                  <a:rPr lang="en-US" sz="1200" i="0">
+                    <a:latin typeface="Cambria Math" panose="02040503050406030204" pitchFamily="18" charset="0"/>
+                  </a:rPr>
+                  <a:t>𝑥 ̂^𝑙, 𝑦 ̂^𝑙</a:t>
+                </a:r>
+                <a:r>
+                  <a:rPr lang="en-US" sz="1200" b="0" i="0">
+                    <a:latin typeface="Cambria Math" panose="02040503050406030204" pitchFamily="18" charset="0"/>
+                  </a:rPr>
+                  <a:t>:</a:t>
+                </a:r>
+                <a:r>
+                  <a:rPr lang="en-US" sz="1200" i="0">
+                    <a:latin typeface="Cambria Math" panose="02040503050406030204" pitchFamily="18" charset="0"/>
+                  </a:rPr>
+                  <a:t>feature activations of a pretrained network (e.g., AlexNet, VGG) at layer 𝑙</a:t>
+                </a:r>
+                <a:endParaRPr lang="en-US" sz="1200" dirty="0"/>
+              </a:p>
+              <a:p>
+                <a:pPr/>
+                <a:r>
+                  <a:rPr lang="en-US" sz="1200" i="0">
+                    <a:latin typeface="Cambria Math" panose="02040503050406030204" pitchFamily="18" charset="0"/>
+                  </a:rPr>
+                  <a:t>𝑤_𝑙= learned per−channel weights for layer 𝑙</a:t>
+                </a:r>
+                <a:endParaRPr lang="en-US" sz="1200" dirty="0"/>
+              </a:p>
+              <a:p>
+                <a:pPr/>
+                <a:r>
+                  <a:rPr lang="en-US" sz="1200" i="0">
+                    <a:latin typeface="Cambria Math" panose="02040503050406030204" pitchFamily="18" charset="0"/>
+                  </a:rPr>
+                  <a:t>𝐻_𝑙, 𝑊_𝑙  = spatial dimensions of layer 𝑙</a:t>
+                </a:r>
+                <a:endParaRPr lang="en-US" sz="1200" dirty="0"/>
+              </a:p>
+              <a:p>
+                <a:endParaRPr lang="en-US" sz="1200" dirty="0"/>
+              </a:p>
+              <a:p>
+                <a:endParaRPr lang="en-US" dirty="0"/>
+              </a:p>
+            </p:txBody>
+          </p:sp>
+        </mc:Fallback>
+      </mc:AlternateContent>
+      <p:sp>
+        <p:nvSpPr>
+          <p:cNvPr id="4" name="Slide Number Placeholder 3"/>
+          <p:cNvSpPr>
+            <a:spLocks noGrp="1"/>
+          </p:cNvSpPr>
+          <p:nvPr>
+            <p:ph type="sldNum" sz="quarter" idx="5"/>
+          </p:nvPr>
+        </p:nvSpPr>
+        <p:spPr/>
+        <p:txBody>
+          <a:bodyPr/>
+          <a:lstStyle/>
+          <a:p>
+            <a:fld id="{F727A8F3-6447-4D56-B1DA-1C35DDA8BB16}" type="slidenum">
+              <a:rPr lang="en-US" smtClean="0"/>
+              <a:t>6</a:t>
+            </a:fld>
+            <a:endParaRPr lang="en-US"/>
+          </a:p>
+        </p:txBody>
+      </p:sp>
+    </p:spTree>
+    <p:extLst>
+      <p:ext uri="{BB962C8B-B14F-4D97-AF65-F5344CB8AC3E}">
+        <p14:creationId xmlns:p14="http://schemas.microsoft.com/office/powerpoint/2010/main" val="282634261"/>
+      </p:ext>
+    </p:extLst>
+  </p:cSld>
+  <p:clrMapOvr>
+    <a:masterClrMapping/>
+  </p:clrMapOvr>
+</p:notes>
+</file>
+
+<file path=ppt/notesSlides/notesSlide2.xml><?xml version="1.0" encoding="utf-8"?>
+<p:notes xmlns:a="http://schemas.openxmlformats.org/drawingml/2006/main" xmlns:r="http://schemas.openxmlformats.org/officeDocument/2006/relationships" xmlns:p="http://schemas.openxmlformats.org/presentationml/2006/main">
+  <p:cSld>
+    <p:spTree>
+      <p:nvGrpSpPr>
+        <p:cNvPr id="1" name=""/>
+        <p:cNvGrpSpPr/>
+        <p:nvPr/>
+      </p:nvGrpSpPr>
+      <p:grpSpPr>
+        <a:xfrm>
+          <a:off x="0" y="0"/>
+          <a:ext cx="0" cy="0"/>
+          <a:chOff x="0" y="0"/>
+          <a:chExt cx="0" cy="0"/>
+        </a:xfrm>
+      </p:grpSpPr>
+      <p:sp>
+        <p:nvSpPr>
+          <p:cNvPr id="2" name="Slide Image Placeholder 1"/>
+          <p:cNvSpPr>
+            <a:spLocks noGrp="1" noRot="1" noChangeAspect="1"/>
+          </p:cNvSpPr>
+          <p:nvPr>
+            <p:ph type="sldImg"/>
+          </p:nvPr>
+        </p:nvSpPr>
+        <p:spPr/>
+      </p:sp>
+      <p:sp>
+        <p:nvSpPr>
+          <p:cNvPr id="3" name="Notes Placeholder 2"/>
+          <p:cNvSpPr>
+            <a:spLocks noGrp="1"/>
+          </p:cNvSpPr>
+          <p:nvPr>
+            <p:ph type="body" idx="1"/>
+          </p:nvPr>
+        </p:nvSpPr>
+        <p:spPr/>
+        <p:txBody>
+          <a:bodyPr/>
+          <a:lstStyle/>
+          <a:p>
+            <a:r>
+              <a:rPr lang="en-US" sz="1200" dirty="0"/>
+              <a:t>1. </a:t>
+            </a:r>
+            <a:r>
+              <a:rPr lang="en-US" sz="1200" b="1" dirty="0"/>
+              <a:t>Gradient Masking (Loss Masking) </a:t>
+            </a:r>
+            <a:r>
+              <a:rPr lang="en-US" sz="1200" dirty="0"/>
+              <a:t>– Weight loss by (1-mask).</a:t>
+            </a:r>
+          </a:p>
+          <a:p>
+            <a:pPr marL="285750" indent="-285750">
+              <a:buFont typeface="Arial" panose="020B0604020202020204" pitchFamily="34" charset="0"/>
+              <a:buChar char="•"/>
+            </a:pPr>
+            <a:r>
+              <a:rPr lang="en-US" sz="1200" dirty="0"/>
+              <a:t>It down-weights masked pixels in loss.</a:t>
+            </a:r>
+          </a:p>
+          <a:p>
+            <a:pPr marL="285750" indent="-285750">
+              <a:buFont typeface="Arial" panose="020B0604020202020204" pitchFamily="34" charset="0"/>
+              <a:buChar char="•"/>
+            </a:pPr>
+            <a:r>
+              <a:rPr lang="en-US" dirty="0"/>
+              <a:t>Maintains structural integrity</a:t>
+            </a:r>
+          </a:p>
+          <a:p>
+            <a:pPr marL="285750" indent="-285750">
+              <a:buFont typeface="Arial" panose="020B0604020202020204" pitchFamily="34" charset="0"/>
+              <a:buChar char="•"/>
+            </a:pPr>
+            <a:r>
+              <a:rPr lang="en-US" dirty="0"/>
+              <a:t>Simpler to implement.</a:t>
+            </a:r>
+          </a:p>
+          <a:p>
+            <a:pPr marL="285750" indent="-285750">
+              <a:buFont typeface="Arial" panose="020B0604020202020204" pitchFamily="34" charset="0"/>
+              <a:buChar char="•"/>
+            </a:pPr>
+            <a:endParaRPr lang="en-US" sz="1200" dirty="0"/>
+          </a:p>
+          <a:p>
+            <a:r>
+              <a:rPr lang="en-US" sz="1200" dirty="0"/>
+              <a:t>2</a:t>
+            </a:r>
+            <a:r>
+              <a:rPr lang="en-US" sz="1200" b="1" dirty="0"/>
+              <a:t>. Ray Filtering </a:t>
+            </a:r>
+            <a:r>
+              <a:rPr lang="en-US" sz="1200" dirty="0"/>
+              <a:t>– Discard rays passing through dynamic regions.</a:t>
+            </a:r>
+          </a:p>
+          <a:p>
+            <a:pPr marL="285750" indent="-285750">
+              <a:buFont typeface="Arial" panose="020B0604020202020204" pitchFamily="34" charset="0"/>
+              <a:buChar char="•"/>
+            </a:pPr>
+            <a:r>
+              <a:rPr lang="en-US" sz="1200" dirty="0"/>
+              <a:t>Removes masked rays fully from training</a:t>
+            </a:r>
+          </a:p>
+          <a:p>
+            <a:pPr marL="285750" indent="-285750">
+              <a:buFont typeface="Arial" panose="020B0604020202020204" pitchFamily="34" charset="0"/>
+              <a:buChar char="•"/>
+            </a:pPr>
+            <a:r>
+              <a:rPr lang="en-US" sz="1200" dirty="0"/>
+              <a:t>Higher PSNR</a:t>
+            </a:r>
+          </a:p>
+          <a:p>
+            <a:pPr marL="285750" indent="-285750">
+              <a:buFont typeface="Arial" panose="020B0604020202020204" pitchFamily="34" charset="0"/>
+              <a:buChar char="•"/>
+            </a:pPr>
+            <a:r>
+              <a:rPr lang="en-US" sz="1200" dirty="0"/>
+              <a:t>Sharper geometry</a:t>
+            </a:r>
+          </a:p>
+          <a:p>
+            <a:pPr marL="285750" indent="-285750">
+              <a:buFont typeface="Arial" panose="020B0604020202020204" pitchFamily="34" charset="0"/>
+              <a:buChar char="•"/>
+            </a:pPr>
+            <a:endParaRPr lang="en-US" sz="1200" dirty="0"/>
+          </a:p>
+          <a:p>
+            <a:r>
+              <a:rPr lang="en-US" sz="1200" dirty="0"/>
+              <a:t>3. </a:t>
+            </a:r>
+            <a:r>
+              <a:rPr lang="en-US" sz="1200" b="1" dirty="0"/>
+              <a:t>Baseline (unmasked) </a:t>
+            </a:r>
+            <a:r>
+              <a:rPr lang="en-US" sz="1200" dirty="0"/>
+              <a:t>- trains 3D Gaussian Splatting normally. </a:t>
+            </a:r>
+          </a:p>
+          <a:p>
+            <a:pPr marL="342900" indent="-342900">
+              <a:buFont typeface="Arial" panose="020B0604020202020204" pitchFamily="34" charset="0"/>
+              <a:buChar char="•"/>
+            </a:pPr>
+            <a:r>
+              <a:rPr lang="en-US" sz="1200" dirty="0"/>
+              <a:t>uses all pixels from all training images</a:t>
+            </a:r>
+          </a:p>
+          <a:p>
+            <a:pPr marL="342900" indent="-342900">
+              <a:buFont typeface="Arial" panose="020B0604020202020204" pitchFamily="34" charset="0"/>
+              <a:buChar char="•"/>
+            </a:pPr>
+            <a:r>
+              <a:rPr lang="en-US" dirty="0"/>
+              <a:t>No mask guidance</a:t>
+            </a:r>
+          </a:p>
+          <a:p>
+            <a:endParaRPr lang="en-US" dirty="0"/>
+          </a:p>
+        </p:txBody>
+      </p:sp>
+      <p:sp>
+        <p:nvSpPr>
+          <p:cNvPr id="4" name="Slide Number Placeholder 3"/>
+          <p:cNvSpPr>
+            <a:spLocks noGrp="1"/>
+          </p:cNvSpPr>
+          <p:nvPr>
+            <p:ph type="sldNum" sz="quarter" idx="5"/>
+          </p:nvPr>
+        </p:nvSpPr>
+        <p:spPr/>
+        <p:txBody>
+          <a:bodyPr/>
+          <a:lstStyle/>
+          <a:p>
+            <a:fld id="{F727A8F3-6447-4D56-B1DA-1C35DDA8BB16}" type="slidenum">
+              <a:rPr lang="en-US" smtClean="0"/>
+              <a:t>7</a:t>
+            </a:fld>
+            <a:endParaRPr lang="en-US"/>
+          </a:p>
+        </p:txBody>
+      </p:sp>
+    </p:spTree>
+    <p:extLst>
+      <p:ext uri="{BB962C8B-B14F-4D97-AF65-F5344CB8AC3E}">
+        <p14:creationId xmlns:p14="http://schemas.microsoft.com/office/powerpoint/2010/main" val="3229542468"/>
+      </p:ext>
+    </p:extLst>
+  </p:cSld>
+  <p:clrMapOvr>
+    <a:masterClrMapping/>
+  </p:clrMapOvr>
+</p:notes>
+</file>
+
+<file path=ppt/notesSlides/notesSlide3.xml><?xml version="1.0" encoding="utf-8"?>
+<p:notes xmlns:a="http://schemas.openxmlformats.org/drawingml/2006/main" xmlns:r="http://schemas.openxmlformats.org/officeDocument/2006/relationships" xmlns:p="http://schemas.openxmlformats.org/presentationml/2006/main">
+  <p:cSld>
+    <p:spTree>
+      <p:nvGrpSpPr>
+        <p:cNvPr id="1" name=""/>
+        <p:cNvGrpSpPr/>
+        <p:nvPr/>
+      </p:nvGrpSpPr>
+      <p:grpSpPr>
+        <a:xfrm>
+          <a:off x="0" y="0"/>
+          <a:ext cx="0" cy="0"/>
+          <a:chOff x="0" y="0"/>
+          <a:chExt cx="0" cy="0"/>
+        </a:xfrm>
+      </p:grpSpPr>
+      <p:sp>
+        <p:nvSpPr>
+          <p:cNvPr id="2" name="Slide Image Placeholder 1"/>
+          <p:cNvSpPr>
+            <a:spLocks noGrp="1" noRot="1" noChangeAspect="1"/>
+          </p:cNvSpPr>
+          <p:nvPr>
+            <p:ph type="sldImg"/>
+          </p:nvPr>
+        </p:nvSpPr>
+        <p:spPr/>
+      </p:sp>
+      <p:sp>
+        <p:nvSpPr>
+          <p:cNvPr id="3" name="Notes Placeholder 2"/>
+          <p:cNvSpPr>
+            <a:spLocks noGrp="1"/>
+          </p:cNvSpPr>
+          <p:nvPr>
+            <p:ph type="body" idx="1"/>
+          </p:nvPr>
+        </p:nvSpPr>
+        <p:spPr/>
+        <p:txBody>
+          <a:bodyPr/>
+          <a:lstStyle/>
+          <a:p>
+            <a:r>
+              <a:rPr lang="en-US" sz="1200" dirty="0">
+                <a:latin typeface="Times New Roman" panose="02020603050405020304" pitchFamily="18" charset="0"/>
+                <a:cs typeface="Times New Roman" panose="02020603050405020304" pitchFamily="18" charset="0"/>
+              </a:rPr>
+              <a:t>Compare PSNR/SSIM/LPIPS for each masking strategy</a:t>
+            </a:r>
+          </a:p>
+          <a:p>
+            <a:r>
+              <a:rPr lang="en-US" sz="1200" dirty="0">
+                <a:latin typeface="Times New Roman" panose="02020603050405020304" pitchFamily="18" charset="0"/>
+                <a:cs typeface="Times New Roman" panose="02020603050405020304" pitchFamily="18" charset="0"/>
+              </a:rPr>
+              <a:t>Ray filtering typically yields sharper details</a:t>
+            </a:r>
+          </a:p>
+          <a:p>
+            <a:r>
+              <a:rPr lang="en-US" sz="1200" dirty="0">
+                <a:latin typeface="Times New Roman" panose="02020603050405020304" pitchFamily="18" charset="0"/>
+                <a:cs typeface="Times New Roman" panose="02020603050405020304" pitchFamily="18" charset="0"/>
+              </a:rPr>
+              <a:t>Gradient masking smooth but robust</a:t>
+            </a:r>
+          </a:p>
+          <a:p>
+            <a:endParaRPr lang="en-US" dirty="0"/>
+          </a:p>
+        </p:txBody>
+      </p:sp>
+      <p:sp>
+        <p:nvSpPr>
+          <p:cNvPr id="4" name="Slide Number Placeholder 3"/>
+          <p:cNvSpPr>
+            <a:spLocks noGrp="1"/>
+          </p:cNvSpPr>
+          <p:nvPr>
+            <p:ph type="sldNum" sz="quarter" idx="5"/>
+          </p:nvPr>
+        </p:nvSpPr>
+        <p:spPr/>
+        <p:txBody>
+          <a:bodyPr/>
+          <a:lstStyle/>
+          <a:p>
+            <a:fld id="{F727A8F3-6447-4D56-B1DA-1C35DDA8BB16}" type="slidenum">
+              <a:rPr lang="en-US" smtClean="0"/>
+              <a:t>9</a:t>
+            </a:fld>
+            <a:endParaRPr lang="en-US"/>
+          </a:p>
+        </p:txBody>
+      </p:sp>
+    </p:spTree>
+    <p:extLst>
+      <p:ext uri="{BB962C8B-B14F-4D97-AF65-F5344CB8AC3E}">
+        <p14:creationId xmlns:p14="http://schemas.microsoft.com/office/powerpoint/2010/main" val="4071299284"/>
+      </p:ext>
+    </p:extLst>
+  </p:cSld>
+  <p:clrMapOvr>
+    <a:masterClrMapping/>
+  </p:clrMapOvr>
+</p:notes>
+</file>
+
+<file path=ppt/notesSlides/notesSlide4.xml><?xml version="1.0" encoding="utf-8"?>
 <p:notes xmlns:a="http://schemas.openxmlformats.org/drawingml/2006/main" xmlns:r="http://schemas.openxmlformats.org/officeDocument/2006/relationships" xmlns:p="http://schemas.openxmlformats.org/presentationml/2006/main">
   <p:cSld>
     <p:spTree>
@@ -6920,14 +8199,14 @@
           <p:nvPr>
             <p:extLst>
               <p:ext uri="{D42A27DB-BD31-4B8C-83A1-F6EECF244321}">
-                <p14:modId xmlns:p14="http://schemas.microsoft.com/office/powerpoint/2010/main" val="2344136089"/>
+                <p14:modId xmlns:p14="http://schemas.microsoft.com/office/powerpoint/2010/main" val="3345652479"/>
               </p:ext>
             </p:extLst>
           </p:nvPr>
         </p:nvGraphicFramePr>
         <p:xfrm>
-          <a:off x="365124" y="1253560"/>
-          <a:ext cx="4229100" cy="2734971"/>
+          <a:off x="365124" y="1253561"/>
+          <a:ext cx="11456762" cy="4801458"/>
         </p:xfrm>
         <a:graphic>
           <a:graphicData uri="http://schemas.openxmlformats.org/drawingml/2006/table">
@@ -6936,28 +8215,28 @@
                 <a:tableStyleId>{5C22544A-7EE6-4342-B048-85BDC9FD1C3A}</a:tableStyleId>
               </a:tblPr>
               <a:tblGrid>
-                <a:gridCol w="1208314">
+                <a:gridCol w="3273360">
                   <a:extLst>
                     <a:ext uri="{9D8B030D-6E8A-4147-A177-3AD203B41FA5}">
                       <a16:colId xmlns:a16="http://schemas.microsoft.com/office/drawing/2014/main" val="20000"/>
                     </a:ext>
                   </a:extLst>
                 </a:gridCol>
-                <a:gridCol w="869725">
+                <a:gridCol w="2691744">
                   <a:extLst>
                     <a:ext uri="{9D8B030D-6E8A-4147-A177-3AD203B41FA5}">
                       <a16:colId xmlns:a16="http://schemas.microsoft.com/office/drawing/2014/main" val="20001"/>
                     </a:ext>
                   </a:extLst>
                 </a:gridCol>
-                <a:gridCol w="760241">
+                <a:gridCol w="1934883">
                   <a:extLst>
                     <a:ext uri="{9D8B030D-6E8A-4147-A177-3AD203B41FA5}">
                       <a16:colId xmlns:a16="http://schemas.microsoft.com/office/drawing/2014/main" val="20002"/>
                     </a:ext>
                   </a:extLst>
                 </a:gridCol>
-                <a:gridCol w="1390820">
+                <a:gridCol w="3556775">
                   <a:extLst>
                     <a:ext uri="{9D8B030D-6E8A-4147-A177-3AD203B41FA5}">
                       <a16:colId xmlns:a16="http://schemas.microsoft.com/office/drawing/2014/main" val="20003"/>
@@ -6965,7 +8244,7 @@
                   </a:extLst>
                 </a:gridCol>
               </a:tblGrid>
-              <a:tr h="498720">
+              <a:tr h="1178094">
                 <a:tc>
                   <a:txBody>
                     <a:bodyPr/>
@@ -7009,6 +8288,7 @@
                     <a:lstStyle/>
                     <a:p>
                       <a:r>
+                        <a:rPr dirty="0"/>
                         <a:t>LPIPS</a:t>
                       </a:r>
                     </a:p>
@@ -7021,7 +8301,7 @@
                   </a:ext>
                 </a:extLst>
               </a:tr>
-              <a:tr h="745417">
+              <a:tr h="1207788">
                 <a:tc>
                   <a:txBody>
                     <a:bodyPr/>
@@ -7041,9 +8321,18 @@
                     <a:lstStyle/>
                     <a:p>
                       <a:r>
-                        <a:rPr dirty="0"/>
-                        <a:t>21.72</a:t>
+                        <a:rPr lang="en-US" sz="1799" b="0" i="0" kern="1200" dirty="0">
+                          <a:solidFill>
+                            <a:schemeClr val="dk1"/>
+                          </a:solidFill>
+                          <a:effectLst/>
+                          <a:latin typeface="+mn-lt"/>
+                          <a:ea typeface="+mn-ea"/>
+                          <a:cs typeface="+mn-cs"/>
+                        </a:rPr>
+                        <a:t>9.05</a:t>
                       </a:r>
+                      <a:endParaRPr dirty="0"/>
                     </a:p>
                   </a:txBody>
                   <a:tcPr/>
@@ -7054,9 +8343,18 @@
                     <a:lstStyle/>
                     <a:p>
                       <a:r>
-                        <a:rPr dirty="0"/>
-                        <a:t>0.953</a:t>
+                        <a:rPr lang="en-US" sz="1799" b="0" i="0" kern="1200" dirty="0">
+                          <a:solidFill>
+                            <a:schemeClr val="dk1"/>
+                          </a:solidFill>
+                          <a:effectLst/>
+                          <a:latin typeface="+mn-lt"/>
+                          <a:ea typeface="+mn-ea"/>
+                          <a:cs typeface="+mn-cs"/>
+                        </a:rPr>
+                        <a:t>0.784</a:t>
                       </a:r>
+                      <a:endParaRPr dirty="0"/>
                     </a:p>
                   </a:txBody>
                   <a:tcPr/>
@@ -7067,8 +8365,18 @@
                     <a:lstStyle/>
                     <a:p>
                       <a:r>
-                        <a:t>0.211</a:t>
+                        <a:rPr lang="en-US" sz="1799" b="0" i="0" kern="1200" dirty="0">
+                          <a:solidFill>
+                            <a:schemeClr val="dk1"/>
+                          </a:solidFill>
+                          <a:effectLst/>
+                          <a:latin typeface="+mn-lt"/>
+                          <a:ea typeface="+mn-ea"/>
+                          <a:cs typeface="+mn-cs"/>
+                        </a:rPr>
+                        <a:t>0.506</a:t>
                       </a:r>
+                      <a:endParaRPr dirty="0"/>
                     </a:p>
                   </a:txBody>
                   <a:tcPr/>
@@ -7079,15 +8387,33 @@
                   </a:ext>
                 </a:extLst>
               </a:tr>
-              <a:tr h="745417">
+              <a:tr h="1207788">
                 <a:tc>
                   <a:txBody>
                     <a:bodyPr/>
                     <a:lstStyle/>
                     <a:p>
                       <a:r>
+                        <a:rPr dirty="0"/>
                         <a:t>Gradient</a:t>
                       </a:r>
+                      <a:r>
+                        <a:rPr lang="en-US" dirty="0"/>
+                        <a:t> (</a:t>
+                      </a:r>
+                      <a:r>
+                        <a:rPr lang="en-US" sz="1799" b="0" i="0" kern="1200" dirty="0">
+                          <a:solidFill>
+                            <a:schemeClr val="dk1"/>
+                          </a:solidFill>
+                          <a:effectLst/>
+                          <a:latin typeface="+mn-lt"/>
+                          <a:ea typeface="+mn-ea"/>
+                          <a:cs typeface="+mn-cs"/>
+                        </a:rPr>
+                        <a:t>Loss-Mask)</a:t>
+                      </a:r>
+                      <a:endParaRPr dirty="0"/>
                     </a:p>
                   </a:txBody>
                   <a:tcPr/>
@@ -7098,9 +8424,18 @@
                     <a:lstStyle/>
                     <a:p>
                       <a:r>
-                        <a:rPr dirty="0"/>
-                        <a:t>7.63</a:t>
+                        <a:rPr lang="en-US" sz="1799" b="0" i="0" kern="1200" dirty="0">
+                          <a:solidFill>
+                            <a:schemeClr val="dk1"/>
+                          </a:solidFill>
+                          <a:effectLst/>
+                          <a:latin typeface="+mn-lt"/>
+                          <a:ea typeface="+mn-ea"/>
+                          <a:cs typeface="+mn-cs"/>
+                        </a:rPr>
+                        <a:t>18.35</a:t>
                       </a:r>
+                      <a:endParaRPr dirty="0"/>
                     </a:p>
                   </a:txBody>
                   <a:tcPr/>
@@ -7111,8 +8446,18 @@
                     <a:lstStyle/>
                     <a:p>
                       <a:r>
-                        <a:t>0.647</a:t>
+                        <a:rPr lang="en-US" sz="1799" b="0" i="0" kern="1200" dirty="0">
+                          <a:solidFill>
+                            <a:schemeClr val="dk1"/>
+                          </a:solidFill>
+                          <a:effectLst/>
+                          <a:latin typeface="+mn-lt"/>
+                          <a:ea typeface="+mn-ea"/>
+                          <a:cs typeface="+mn-cs"/>
+                        </a:rPr>
+                        <a:t>0.88</a:t>
                       </a:r>
+                      <a:endParaRPr dirty="0"/>
                     </a:p>
                   </a:txBody>
                   <a:tcPr/>
@@ -7123,9 +8468,18 @@
                     <a:lstStyle/>
                     <a:p>
                       <a:r>
-                        <a:rPr dirty="0"/>
-                        <a:t>0.731</a:t>
+                        <a:rPr lang="en-US" sz="1799" b="0" i="0" kern="1200" dirty="0">
+                          <a:solidFill>
+                            <a:schemeClr val="dk1"/>
+                          </a:solidFill>
+                          <a:effectLst/>
+                          <a:latin typeface="+mn-lt"/>
+                          <a:ea typeface="+mn-ea"/>
+                          <a:cs typeface="+mn-cs"/>
+                        </a:rPr>
+                        <a:t>0.08</a:t>
                       </a:r>
+                      <a:endParaRPr dirty="0"/>
                     </a:p>
                   </a:txBody>
                   <a:tcPr/>
@@ -7136,7 +8490,7 @@
                   </a:ext>
                 </a:extLst>
               </a:tr>
-              <a:tr h="745417">
+              <a:tr h="1207788">
                 <a:tc>
                   <a:txBody>
                     <a:bodyPr/>
@@ -7156,8 +8510,18 @@
                     <a:lstStyle/>
                     <a:p>
                       <a:r>
-                        <a:t>7.54</a:t>
+                        <a:rPr lang="en-US" sz="1799" b="0" i="0" kern="1200" dirty="0">
+                          <a:solidFill>
+                            <a:schemeClr val="dk1"/>
+                          </a:solidFill>
+                          <a:effectLst/>
+                          <a:latin typeface="+mn-lt"/>
+                          <a:ea typeface="+mn-ea"/>
+                          <a:cs typeface="+mn-cs"/>
+                        </a:rPr>
+                        <a:t>9.04</a:t>
                       </a:r>
+                      <a:endParaRPr dirty="0"/>
                     </a:p>
                   </a:txBody>
                   <a:tcPr/>
@@ -7168,8 +8532,18 @@
                     <a:lstStyle/>
                     <a:p>
                       <a:r>
-                        <a:t>0.637</a:t>
+                        <a:rPr lang="en-US" sz="1799" b="0" i="0" kern="1200" dirty="0">
+                          <a:solidFill>
+                            <a:schemeClr val="dk1"/>
+                          </a:solidFill>
+                          <a:effectLst/>
+                          <a:latin typeface="+mn-lt"/>
+                          <a:ea typeface="+mn-ea"/>
+                          <a:cs typeface="+mn-cs"/>
+                        </a:rPr>
+                        <a:t>0.24</a:t>
                       </a:r>
+                      <a:endParaRPr dirty="0"/>
                     </a:p>
                   </a:txBody>
                   <a:tcPr/>
@@ -7197,30 +8571,6 @@
           </a:graphicData>
         </a:graphic>
       </p:graphicFrame>
-      <p:pic>
-        <p:nvPicPr>
-          <p:cNvPr id="5" name="Picture 4" descr="metrics_bars.png"/>
-          <p:cNvPicPr>
-            <a:picLocks noChangeAspect="1"/>
-          </p:cNvPicPr>
-          <p:nvPr/>
-        </p:nvPicPr>
-        <p:blipFill>
-          <a:blip r:embed="rId3"/>
-          <a:stretch>
-            <a:fillRect/>
-          </a:stretch>
-        </p:blipFill>
-        <p:spPr>
-          <a:xfrm>
-            <a:off x="365124" y="4163936"/>
-            <a:ext cx="4229100" cy="1891082"/>
-          </a:xfrm>
-          <a:prstGeom prst="rect">
-            <a:avLst/>
-          </a:prstGeom>
-        </p:spPr>
-      </p:pic>
       <p:sp>
         <p:nvSpPr>
           <p:cNvPr id="6" name="TextBox 5">
@@ -7257,36 +8607,6 @@
           </a:p>
         </p:txBody>
       </p:sp>
-      <p:pic>
-        <p:nvPicPr>
-          <p:cNvPr id="2" name="Picture 1">
-            <a:extLst>
-              <a:ext uri="{FF2B5EF4-FFF2-40B4-BE49-F238E27FC236}">
-                <a16:creationId xmlns:a16="http://schemas.microsoft.com/office/drawing/2014/main" id="{8887C37E-104C-4CD1-A52A-401AB2D3D10C}"/>
-              </a:ext>
-            </a:extLst>
-          </p:cNvPr>
-          <p:cNvPicPr>
-            <a:picLocks noChangeAspect="1"/>
-          </p:cNvPicPr>
-          <p:nvPr/>
-        </p:nvPicPr>
-        <p:blipFill>
-          <a:blip r:embed="rId4"/>
-          <a:stretch>
-            <a:fillRect/>
-          </a:stretch>
-        </p:blipFill>
-        <p:spPr>
-          <a:xfrm>
-            <a:off x="5214938" y="1423450"/>
-            <a:ext cx="6772275" cy="4505863"/>
-          </a:xfrm>
-          <a:prstGeom prst="rect">
-            <a:avLst/>
-          </a:prstGeom>
-        </p:spPr>
-      </p:pic>
       <p:sp>
         <p:nvSpPr>
           <p:cNvPr id="7" name="TextBox 6">
@@ -7317,101 +8637,7 @@
           <a:p>
             <a:r>
               <a:rPr lang="en-US" dirty="0"/>
-              <a:t>Table 1: Evaluation Comparison</a:t>
-            </a:r>
-          </a:p>
-        </p:txBody>
-      </p:sp>
-      <p:sp>
-        <p:nvSpPr>
-          <p:cNvPr id="8" name="TextBox 7">
-            <a:extLst>
-              <a:ext uri="{FF2B5EF4-FFF2-40B4-BE49-F238E27FC236}">
-                <a16:creationId xmlns:a16="http://schemas.microsoft.com/office/drawing/2014/main" id="{EFDE2A59-5186-4BB2-9C77-4311F3A02462}"/>
-              </a:ext>
-            </a:extLst>
-          </p:cNvPr>
-          <p:cNvSpPr txBox="1"/>
-          <p:nvPr/>
-        </p:nvSpPr>
-        <p:spPr>
-          <a:xfrm>
-            <a:off x="185738" y="6230422"/>
-            <a:ext cx="4514850" cy="369332"/>
-          </a:xfrm>
-          <a:prstGeom prst="rect">
-            <a:avLst/>
-          </a:prstGeom>
-          <a:noFill/>
-        </p:spPr>
-        <p:txBody>
-          <a:bodyPr wrap="square" rtlCol="0">
-            <a:spAutoFit/>
-          </a:bodyPr>
-          <a:lstStyle/>
-          <a:p>
-            <a:r>
-              <a:rPr lang="en-US" dirty="0"/>
-              <a:t>Fig. 3.1a: </a:t>
-            </a:r>
-            <a:r>
-              <a:rPr lang="en-US" dirty="0" err="1"/>
-              <a:t>Barchart</a:t>
-            </a:r>
-            <a:r>
-              <a:rPr lang="en-US" dirty="0"/>
-              <a:t> view per methods</a:t>
-            </a:r>
-          </a:p>
-        </p:txBody>
-      </p:sp>
-      <p:sp>
-        <p:nvSpPr>
-          <p:cNvPr id="9" name="TextBox 8">
-            <a:extLst>
-              <a:ext uri="{FF2B5EF4-FFF2-40B4-BE49-F238E27FC236}">
-                <a16:creationId xmlns:a16="http://schemas.microsoft.com/office/drawing/2014/main" id="{754358F7-70A0-4E0E-A242-B0416C92E2B1}"/>
-              </a:ext>
-            </a:extLst>
-          </p:cNvPr>
-          <p:cNvSpPr txBox="1"/>
-          <p:nvPr/>
-        </p:nvSpPr>
-        <p:spPr>
-          <a:xfrm>
-            <a:off x="5214939" y="6224412"/>
-            <a:ext cx="6772274" cy="369332"/>
-          </a:xfrm>
-          <a:prstGeom prst="rect">
-            <a:avLst/>
-          </a:prstGeom>
-          <a:noFill/>
-        </p:spPr>
-        <p:txBody>
-          <a:bodyPr wrap="square" rtlCol="0">
-            <a:spAutoFit/>
-          </a:bodyPr>
-          <a:lstStyle/>
-          <a:p>
-            <a:r>
-              <a:rPr lang="en-US" dirty="0"/>
-              <a:t>Fig. 3.1b: </a:t>
-            </a:r>
-            <a:r>
-              <a:rPr lang="en-US" dirty="0" err="1"/>
-              <a:t>Barchart</a:t>
-            </a:r>
-            <a:r>
-              <a:rPr lang="en-US" dirty="0"/>
-              <a:t> view per methods and </a:t>
-            </a:r>
-            <a:r>
-              <a:rPr lang="en-US" dirty="0" err="1"/>
-              <a:t>Reconst</a:t>
-            </a:r>
-            <a:r>
-              <a:rPr lang="en-US" dirty="0"/>
-              <a:t>. errors</a:t>
+              <a:t>Table 3.1: Evaluation Comparison</a:t>
             </a:r>
           </a:p>
         </p:txBody>
@@ -7443,14 +8669,117 @@
       </p:grpSpPr>
       <p:sp>
         <p:nvSpPr>
-          <p:cNvPr id="3" name="TextBox 2"/>
+          <p:cNvPr id="2" name="Title 1">
+            <a:extLst>
+              <a:ext uri="{FF2B5EF4-FFF2-40B4-BE49-F238E27FC236}">
+                <a16:creationId xmlns:a16="http://schemas.microsoft.com/office/drawing/2014/main" id="{7A00AB55-150B-4652-9103-908533E4EFEB}"/>
+              </a:ext>
+            </a:extLst>
+          </p:cNvPr>
+          <p:cNvSpPr>
+            <a:spLocks noGrp="1"/>
+          </p:cNvSpPr>
+          <p:nvPr>
+            <p:ph type="title"/>
+          </p:nvPr>
+        </p:nvSpPr>
+        <p:spPr>
+          <a:xfrm>
+            <a:off x="1269920" y="9605"/>
+            <a:ext cx="9402274" cy="886225"/>
+          </a:xfrm>
+        </p:spPr>
+        <p:txBody>
+          <a:bodyPr/>
+          <a:lstStyle/>
+          <a:p>
+            <a:pPr algn="ctr"/>
+            <a:r>
+              <a:rPr lang="en-US" sz="3200" dirty="0">
+                <a:latin typeface="Times New Roman" panose="02020603050405020304" pitchFamily="18" charset="0"/>
+                <a:cs typeface="Times New Roman" panose="02020603050405020304" pitchFamily="18" charset="0"/>
+              </a:rPr>
+              <a:t>METRICS COMPARISON</a:t>
+            </a:r>
+          </a:p>
+        </p:txBody>
+      </p:sp>
+      <p:pic>
+        <p:nvPicPr>
+          <p:cNvPr id="4" name="Picture 3">
+            <a:extLst>
+              <a:ext uri="{FF2B5EF4-FFF2-40B4-BE49-F238E27FC236}">
+                <a16:creationId xmlns:a16="http://schemas.microsoft.com/office/drawing/2014/main" id="{127DDA5F-1406-407B-9A48-A5AD8B3B2E4C}"/>
+              </a:ext>
+            </a:extLst>
+          </p:cNvPr>
+          <p:cNvPicPr>
+            <a:picLocks noChangeAspect="1"/>
+          </p:cNvPicPr>
+          <p:nvPr/>
+        </p:nvPicPr>
+        <p:blipFill>
+          <a:blip r:embed="rId2"/>
+          <a:stretch>
+            <a:fillRect/>
+          </a:stretch>
+        </p:blipFill>
+        <p:spPr>
+          <a:xfrm>
+            <a:off x="776790" y="718457"/>
+            <a:ext cx="9689824" cy="5453743"/>
+          </a:xfrm>
+          <a:prstGeom prst="rect">
+            <a:avLst/>
+          </a:prstGeom>
+        </p:spPr>
+      </p:pic>
+      <p:pic>
+        <p:nvPicPr>
+          <p:cNvPr id="6" name="Picture 5">
+            <a:extLst>
+              <a:ext uri="{FF2B5EF4-FFF2-40B4-BE49-F238E27FC236}">
+                <a16:creationId xmlns:a16="http://schemas.microsoft.com/office/drawing/2014/main" id="{69BE007C-A924-4798-8C4F-A8EB0CD4ED65}"/>
+              </a:ext>
+            </a:extLst>
+          </p:cNvPr>
+          <p:cNvPicPr>
+            <a:picLocks noChangeAspect="1"/>
+          </p:cNvPicPr>
+          <p:nvPr/>
+        </p:nvPicPr>
+        <p:blipFill>
+          <a:blip r:embed="rId3"/>
+          <a:stretch>
+            <a:fillRect/>
+          </a:stretch>
+        </p:blipFill>
+        <p:spPr>
+          <a:xfrm>
+            <a:off x="8758334" y="1094016"/>
+            <a:ext cx="1913860" cy="886225"/>
+          </a:xfrm>
+          <a:prstGeom prst="rect">
+            <a:avLst/>
+          </a:prstGeom>
+        </p:spPr>
+      </p:pic>
+      <p:sp>
+        <p:nvSpPr>
+          <p:cNvPr id="5" name="TextBox 4">
+            <a:extLst>
+              <a:ext uri="{FF2B5EF4-FFF2-40B4-BE49-F238E27FC236}">
+                <a16:creationId xmlns:a16="http://schemas.microsoft.com/office/drawing/2014/main" id="{C87D2ED0-19A6-4CB0-BDDD-E0D4F736669F}"/>
+              </a:ext>
+            </a:extLst>
+          </p:cNvPr>
           <p:cNvSpPr txBox="1"/>
           <p:nvPr/>
         </p:nvSpPr>
         <p:spPr>
           <a:xfrm>
-            <a:off x="3713791" y="335250"/>
-            <a:ext cx="4459619" cy="584775"/>
+            <a:off x="1410381" y="6230422"/>
+            <a:ext cx="4514850" cy="369332"/>
           </a:xfrm>
           <a:prstGeom prst="rect">
             <a:avLst/>
@@ -7458,156 +8787,32 @@
           <a:noFill/>
         </p:spPr>
         <p:txBody>
-          <a:bodyPr wrap="none">
-            <a:spAutoFit/>
-          </a:bodyPr>
-          <a:lstStyle/>
-          <a:p>
-            <a:pPr algn="ctr">
-              <a:defRPr sz="2800" b="1"/>
-            </a:pPr>
-            <a:r>
-              <a:rPr lang="en-US" sz="3200" dirty="0">
-                <a:latin typeface="Times New Roman" panose="02020603050405020304" pitchFamily="18" charset="0"/>
-                <a:cs typeface="Times New Roman" panose="02020603050405020304" pitchFamily="18" charset="0"/>
-              </a:rPr>
-              <a:t>3.2: </a:t>
-            </a:r>
-            <a:r>
-              <a:rPr sz="3200" dirty="0">
-                <a:latin typeface="Times New Roman" panose="02020603050405020304" pitchFamily="18" charset="0"/>
-                <a:cs typeface="Times New Roman" panose="02020603050405020304" pitchFamily="18" charset="0"/>
-              </a:rPr>
-              <a:t>Visual Comparisons</a:t>
-            </a:r>
-          </a:p>
-        </p:txBody>
-      </p:sp>
-      <p:sp>
-        <p:nvSpPr>
-          <p:cNvPr id="7" name="TextBox 6"/>
-          <p:cNvSpPr txBox="1"/>
-          <p:nvPr/>
-        </p:nvSpPr>
-        <p:spPr>
-          <a:xfrm>
-            <a:off x="0" y="5613703"/>
-            <a:ext cx="8658224" cy="400110"/>
-          </a:xfrm>
-          <a:prstGeom prst="rect">
-            <a:avLst/>
-          </a:prstGeom>
-          <a:noFill/>
-        </p:spPr>
-        <p:txBody>
-          <a:bodyPr wrap="square">
-            <a:spAutoFit/>
-          </a:bodyPr>
-          <a:lstStyle/>
-          <a:p>
-            <a:pPr algn="ctr">
-              <a:defRPr sz="2000" b="0"/>
-            </a:pPr>
-            <a:r>
-              <a:rPr lang="en-US" dirty="0"/>
-              <a:t>Fig. 3.2 : </a:t>
-            </a:r>
-            <a:r>
-              <a:rPr dirty="0"/>
-              <a:t>Reconstructed images across strategies</a:t>
-            </a:r>
-            <a:r>
-              <a:rPr lang="en-US" dirty="0"/>
-              <a:t> training</a:t>
-            </a:r>
-            <a:endParaRPr dirty="0"/>
-          </a:p>
-        </p:txBody>
-      </p:sp>
-      <p:sp>
-        <p:nvSpPr>
-          <p:cNvPr id="8" name="TextBox 7">
-            <a:extLst>
-              <a:ext uri="{FF2B5EF4-FFF2-40B4-BE49-F238E27FC236}">
-                <a16:creationId xmlns:a16="http://schemas.microsoft.com/office/drawing/2014/main" id="{E71E3D88-DEA8-4D8D-8715-72DC275077A2}"/>
-              </a:ext>
-            </a:extLst>
-          </p:cNvPr>
-          <p:cNvSpPr txBox="1"/>
-          <p:nvPr/>
-        </p:nvSpPr>
-        <p:spPr>
-          <a:xfrm>
-            <a:off x="9101138" y="243959"/>
-            <a:ext cx="3043237" cy="369332"/>
-          </a:xfrm>
-          <a:prstGeom prst="rect">
-            <a:avLst/>
-          </a:prstGeom>
-          <a:noFill/>
-        </p:spPr>
-        <p:txBody>
           <a:bodyPr wrap="square" rtlCol="0">
             <a:spAutoFit/>
           </a:bodyPr>
           <a:lstStyle/>
           <a:p>
-            <a:pPr algn="ctr"/>
             <a:r>
               <a:rPr lang="en-US" dirty="0"/>
-              <a:t>ITMO UNIVERSITY</a:t>
-            </a:r>
-          </a:p>
-        </p:txBody>
-      </p:sp>
-      <p:pic>
-        <p:nvPicPr>
-          <p:cNvPr id="2050" name="Picture 2">
-            <a:extLst>
-              <a:ext uri="{FF2B5EF4-FFF2-40B4-BE49-F238E27FC236}">
-                <a16:creationId xmlns:a16="http://schemas.microsoft.com/office/drawing/2014/main" id="{584F71CC-3353-42FE-BB15-1BB50C6CA2CE}"/>
-              </a:ext>
-            </a:extLst>
-          </p:cNvPr>
-          <p:cNvPicPr>
-            <a:picLocks noChangeAspect="1" noChangeArrowheads="1"/>
-          </p:cNvPicPr>
-          <p:nvPr/>
-        </p:nvPicPr>
-        <p:blipFill>
-          <a:blip r:embed="rId2">
-            <a:extLst>
-              <a:ext uri="{28A0092B-C50C-407E-A947-70E740481C1C}">
-                <a14:useLocalDpi xmlns:a14="http://schemas.microsoft.com/office/drawing/2010/main" val="0"/>
-              </a:ext>
-            </a:extLst>
-          </a:blip>
-          <a:srcRect/>
-          <a:stretch>
-            <a:fillRect/>
-          </a:stretch>
-        </p:blipFill>
-        <p:spPr bwMode="auto">
-          <a:xfrm>
-            <a:off x="920981" y="920025"/>
-            <a:ext cx="8423044" cy="4343741"/>
-          </a:xfrm>
-          <a:prstGeom prst="rect">
-            <a:avLst/>
-          </a:prstGeom>
-          <a:noFill/>
-          <a:extLst>
-            <a:ext uri="{909E8E84-426E-40DD-AFC4-6F175D3DCCD1}">
-              <a14:hiddenFill xmlns:a14="http://schemas.microsoft.com/office/drawing/2010/main">
-                <a:solidFill>
-                  <a:srgbClr val="FFFFFF"/>
-                </a:solidFill>
-              </a14:hiddenFill>
-            </a:ext>
-          </a:extLst>
-        </p:spPr>
-      </p:pic>
+              <a:t>Fig. 3.1: </a:t>
+            </a:r>
+            <a:r>
+              <a:rPr lang="en-US" dirty="0" err="1"/>
+              <a:t>Barchart</a:t>
+            </a:r>
+            <a:r>
+              <a:rPr lang="en-US" dirty="0"/>
+              <a:t> view per methods</a:t>
+            </a:r>
+          </a:p>
+        </p:txBody>
+      </p:sp>
     </p:spTree>
+    <p:extLst>
+      <p:ext uri="{BB962C8B-B14F-4D97-AF65-F5344CB8AC3E}">
+        <p14:creationId xmlns:p14="http://schemas.microsoft.com/office/powerpoint/2010/main" val="86238351"/>
+      </p:ext>
+    </p:extLst>
   </p:cSld>
   <p:clrMapOvr>
     <a:masterClrMapping/>
@@ -7640,8 +8845,8 @@
         </p:nvSpPr>
         <p:spPr>
           <a:xfrm>
-            <a:off x="4371974" y="457200"/>
-            <a:ext cx="3986213" cy="584775"/>
+            <a:off x="3713791" y="335250"/>
+            <a:ext cx="4459619" cy="584775"/>
           </a:xfrm>
           <a:prstGeom prst="rect">
             <a:avLst/>
@@ -7649,34 +8854,117 @@
           <a:noFill/>
         </p:spPr>
         <p:txBody>
+          <a:bodyPr wrap="none">
+            <a:spAutoFit/>
+          </a:bodyPr>
+          <a:lstStyle/>
+          <a:p>
+            <a:pPr algn="ctr">
+              <a:defRPr sz="2800" b="1"/>
+            </a:pPr>
+            <a:r>
+              <a:rPr lang="en-US" sz="3200" dirty="0">
+                <a:latin typeface="Times New Roman" panose="02020603050405020304" pitchFamily="18" charset="0"/>
+                <a:cs typeface="Times New Roman" panose="02020603050405020304" pitchFamily="18" charset="0"/>
+              </a:rPr>
+              <a:t>3.2: </a:t>
+            </a:r>
+            <a:r>
+              <a:rPr sz="3200" dirty="0">
+                <a:latin typeface="Times New Roman" panose="02020603050405020304" pitchFamily="18" charset="0"/>
+                <a:cs typeface="Times New Roman" panose="02020603050405020304" pitchFamily="18" charset="0"/>
+              </a:rPr>
+              <a:t>Visual Comparisons</a:t>
+            </a:r>
+          </a:p>
+        </p:txBody>
+      </p:sp>
+      <p:sp>
+        <p:nvSpPr>
+          <p:cNvPr id="7" name="TextBox 6"/>
+          <p:cNvSpPr txBox="1"/>
+          <p:nvPr/>
+        </p:nvSpPr>
+        <p:spPr>
+          <a:xfrm>
+            <a:off x="2203337" y="5969091"/>
+            <a:ext cx="7480526" cy="400110"/>
+          </a:xfrm>
+          <a:prstGeom prst="rect">
+            <a:avLst/>
+          </a:prstGeom>
+          <a:noFill/>
+        </p:spPr>
+        <p:txBody>
           <a:bodyPr wrap="square">
             <a:spAutoFit/>
           </a:bodyPr>
           <a:lstStyle/>
           <a:p>
-            <a:pPr>
-              <a:defRPr sz="2800" b="1"/>
+            <a:pPr algn="ctr">
+              <a:defRPr sz="2000" b="0"/>
             </a:pPr>
             <a:r>
-              <a:rPr lang="en-US" sz="3200" dirty="0">
-                <a:latin typeface="Times New Roman" panose="02020603050405020304" pitchFamily="18" charset="0"/>
-                <a:cs typeface="Times New Roman" panose="02020603050405020304" pitchFamily="18" charset="0"/>
-              </a:rPr>
-              <a:t>3.3: </a:t>
-            </a:r>
-            <a:r>
-              <a:rPr sz="3200" dirty="0">
-                <a:latin typeface="Times New Roman" panose="02020603050405020304" pitchFamily="18" charset="0"/>
-                <a:cs typeface="Times New Roman" panose="02020603050405020304" pitchFamily="18" charset="0"/>
-              </a:rPr>
-              <a:t>Training Insights</a:t>
+              <a:rPr lang="en-US" dirty="0"/>
+              <a:t>Fig. 3.2 : </a:t>
+            </a:r>
+            <a:r>
+              <a:rPr dirty="0"/>
+              <a:t>Reconstructed images across strategies</a:t>
+            </a:r>
+            <a:r>
+              <a:rPr lang="en-US" dirty="0"/>
+              <a:t> training</a:t>
+            </a:r>
+            <a:endParaRPr dirty="0"/>
+          </a:p>
+        </p:txBody>
+      </p:sp>
+      <p:sp>
+        <p:nvSpPr>
+          <p:cNvPr id="8" name="TextBox 7">
+            <a:extLst>
+              <a:ext uri="{FF2B5EF4-FFF2-40B4-BE49-F238E27FC236}">
+                <a16:creationId xmlns:a16="http://schemas.microsoft.com/office/drawing/2014/main" id="{E71E3D88-DEA8-4D8D-8715-72DC275077A2}"/>
+              </a:ext>
+            </a:extLst>
+          </p:cNvPr>
+          <p:cNvSpPr txBox="1"/>
+          <p:nvPr/>
+        </p:nvSpPr>
+        <p:spPr>
+          <a:xfrm>
+            <a:off x="9101138" y="243959"/>
+            <a:ext cx="3043237" cy="369332"/>
+          </a:xfrm>
+          <a:prstGeom prst="rect">
+            <a:avLst/>
+          </a:prstGeom>
+          <a:noFill/>
+        </p:spPr>
+        <p:txBody>
+          <a:bodyPr wrap="square" rtlCol="0">
+            <a:spAutoFit/>
+          </a:bodyPr>
+          <a:lstStyle/>
+          <a:p>
+            <a:pPr algn="ctr"/>
+            <a:r>
+              <a:rPr lang="en-US" dirty="0"/>
+              <a:t>ITMO UNIVERSITY</a:t>
             </a:r>
           </a:p>
         </p:txBody>
       </p:sp>
       <p:pic>
         <p:nvPicPr>
-          <p:cNvPr id="4" name="Picture 3" descr="training_loss.png"/>
+          <p:cNvPr id="6" name="Picture 5">
+            <a:extLst>
+              <a:ext uri="{FF2B5EF4-FFF2-40B4-BE49-F238E27FC236}">
+                <a16:creationId xmlns:a16="http://schemas.microsoft.com/office/drawing/2014/main" id="{B2DE0C4E-52E7-484B-ABB5-41428A0CB915}"/>
+              </a:ext>
+            </a:extLst>
+          </p:cNvPr>
           <p:cNvPicPr>
             <a:picLocks noChangeAspect="1"/>
           </p:cNvPicPr>
@@ -7690,85 +8978,44 @@
         </p:blipFill>
         <p:spPr>
           <a:xfrm>
-            <a:off x="914400" y="1371600"/>
-            <a:ext cx="10058400" cy="3657600"/>
+            <a:off x="6094412" y="1527705"/>
+            <a:ext cx="5604556" cy="3697437"/>
           </a:xfrm>
           <a:prstGeom prst="rect">
             <a:avLst/>
           </a:prstGeom>
         </p:spPr>
       </p:pic>
-      <p:sp>
-        <p:nvSpPr>
-          <p:cNvPr id="5" name="TextBox 4">
+      <p:pic>
+        <p:nvPicPr>
+          <p:cNvPr id="10" name="Picture 9">
             <a:extLst>
               <a:ext uri="{FF2B5EF4-FFF2-40B4-BE49-F238E27FC236}">
-                <a16:creationId xmlns:a16="http://schemas.microsoft.com/office/drawing/2014/main" id="{03631939-EB7C-4C6D-B5F9-306995514A93}"/>
+                <a16:creationId xmlns:a16="http://schemas.microsoft.com/office/drawing/2014/main" id="{535668B1-6063-4895-A3D6-7CC26B4AD59F}"/>
               </a:ext>
             </a:extLst>
           </p:cNvPr>
-          <p:cNvSpPr txBox="1"/>
+          <p:cNvPicPr>
+            <a:picLocks noChangeAspect="1"/>
+          </p:cNvPicPr>
           <p:nvPr/>
-        </p:nvSpPr>
+        </p:nvPicPr>
+        <p:blipFill>
+          <a:blip r:embed="rId3"/>
+          <a:stretch>
+            <a:fillRect/>
+          </a:stretch>
+        </p:blipFill>
         <p:spPr>
           <a:xfrm>
-            <a:off x="9101138" y="243959"/>
-            <a:ext cx="3043237" cy="369332"/>
+            <a:off x="489857" y="1527705"/>
+            <a:ext cx="5437414" cy="3697437"/>
           </a:xfrm>
           <a:prstGeom prst="rect">
             <a:avLst/>
           </a:prstGeom>
-          <a:noFill/>
         </p:spPr>
-        <p:txBody>
-          <a:bodyPr wrap="square" rtlCol="0">
-            <a:spAutoFit/>
-          </a:bodyPr>
-          <a:lstStyle/>
-          <a:p>
-            <a:pPr algn="ctr"/>
-            <a:r>
-              <a:rPr lang="en-US" dirty="0"/>
-              <a:t>ITMO UNIVERSITY</a:t>
-            </a:r>
-          </a:p>
-        </p:txBody>
-      </p:sp>
-      <p:sp>
-        <p:nvSpPr>
-          <p:cNvPr id="2" name="TextBox 1">
-            <a:extLst>
-              <a:ext uri="{FF2B5EF4-FFF2-40B4-BE49-F238E27FC236}">
-                <a16:creationId xmlns:a16="http://schemas.microsoft.com/office/drawing/2014/main" id="{4A153CC2-15E1-4462-918A-F1F25EE5B627}"/>
-              </a:ext>
-            </a:extLst>
-          </p:cNvPr>
-          <p:cNvSpPr txBox="1"/>
-          <p:nvPr/>
-        </p:nvSpPr>
-        <p:spPr>
-          <a:xfrm>
-            <a:off x="2557463" y="5700713"/>
-            <a:ext cx="7629525" cy="369332"/>
-          </a:xfrm>
-          <a:prstGeom prst="rect">
-            <a:avLst/>
-          </a:prstGeom>
-          <a:noFill/>
-        </p:spPr>
-        <p:txBody>
-          <a:bodyPr wrap="square" rtlCol="0">
-            <a:spAutoFit/>
-          </a:bodyPr>
-          <a:lstStyle/>
-          <a:p>
-            <a:r>
-              <a:rPr lang="en-US" dirty="0"/>
-              <a:t>Fig. 3.3: TRAINING Losses Across Strategies</a:t>
-            </a:r>
-          </a:p>
-        </p:txBody>
-      </p:sp>
+      </p:pic>
     </p:spTree>
   </p:cSld>
   <p:clrMapOvr>
@@ -7796,57 +9043,14 @@
       </p:grpSpPr>
       <p:sp>
         <p:nvSpPr>
-          <p:cNvPr id="2" name="Title 1">
-            <a:extLst>
-              <a:ext uri="{FF2B5EF4-FFF2-40B4-BE49-F238E27FC236}">
-                <a16:creationId xmlns:a16="http://schemas.microsoft.com/office/drawing/2014/main" id="{9FC77E7C-8180-4F6C-982A-B11DC71C0594}"/>
-              </a:ext>
-            </a:extLst>
-          </p:cNvPr>
-          <p:cNvSpPr>
-            <a:spLocks noGrp="1"/>
-          </p:cNvSpPr>
-          <p:nvPr>
-            <p:ph type="title"/>
-          </p:nvPr>
+          <p:cNvPr id="3" name="TextBox 2"/>
+          <p:cNvSpPr txBox="1"/>
+          <p:nvPr/>
         </p:nvSpPr>
         <p:spPr>
           <a:xfrm>
-            <a:off x="645943" y="452718"/>
-            <a:ext cx="9402274" cy="690282"/>
-          </a:xfrm>
-        </p:spPr>
-        <p:txBody>
-          <a:bodyPr/>
-          <a:lstStyle/>
-          <a:p>
-            <a:pPr algn="ctr"/>
-            <a:r>
-              <a:rPr lang="en-US" sz="3200" b="1" dirty="0">
-                <a:latin typeface="Times New Roman" panose="02020603050405020304" pitchFamily="18" charset="0"/>
-                <a:cs typeface="Times New Roman" panose="02020603050405020304" pitchFamily="18" charset="0"/>
-              </a:rPr>
-              <a:t>3.4: Limitations</a:t>
-            </a:r>
-          </a:p>
-        </p:txBody>
-      </p:sp>
-      <p:sp>
-        <p:nvSpPr>
-          <p:cNvPr id="3" name="TextBox 2">
-            <a:extLst>
-              <a:ext uri="{FF2B5EF4-FFF2-40B4-BE49-F238E27FC236}">
-                <a16:creationId xmlns:a16="http://schemas.microsoft.com/office/drawing/2014/main" id="{DE26413A-BCA6-49FB-8A22-2505CDBFE92A}"/>
-              </a:ext>
-            </a:extLst>
-          </p:cNvPr>
-          <p:cNvSpPr txBox="1"/>
-          <p:nvPr/>
-        </p:nvSpPr>
-        <p:spPr>
-          <a:xfrm>
-            <a:off x="1500188" y="1414463"/>
-            <a:ext cx="8415337" cy="923330"/>
+            <a:off x="4371974" y="457200"/>
+            <a:ext cx="3986213" cy="584775"/>
           </a:xfrm>
           <a:prstGeom prst="rect">
             <a:avLst/>
@@ -7854,57 +9058,61 @@
           <a:noFill/>
         </p:spPr>
         <p:txBody>
-          <a:bodyPr wrap="square" rtlCol="0">
+          <a:bodyPr wrap="square">
             <a:spAutoFit/>
           </a:bodyPr>
           <a:lstStyle/>
           <a:p>
-            <a:pPr marL="285750" indent="-285750">
-              <a:buFont typeface="Arial" panose="020B0604020202020204" pitchFamily="34" charset="0"/>
-              <a:buChar char="•"/>
+            <a:pPr>
+              <a:defRPr sz="2800" b="1"/>
             </a:pPr>
             <a:r>
-              <a:rPr lang="en-US" dirty="0">
+              <a:rPr lang="en-US" sz="3200" dirty="0">
                 <a:latin typeface="Times New Roman" panose="02020603050405020304" pitchFamily="18" charset="0"/>
                 <a:cs typeface="Times New Roman" panose="02020603050405020304" pitchFamily="18" charset="0"/>
               </a:rPr>
-              <a:t>This work was carried out using synthetic data</a:t>
-            </a:r>
-          </a:p>
-          <a:p>
-            <a:pPr marL="285750" indent="-285750">
-              <a:buFont typeface="Arial" panose="020B0604020202020204" pitchFamily="34" charset="0"/>
-              <a:buChar char="•"/>
-            </a:pPr>
-            <a:r>
-              <a:rPr lang="en-US" dirty="0">
+              <a:t>3.3: </a:t>
+            </a:r>
+            <a:r>
+              <a:rPr sz="3200" dirty="0">
                 <a:latin typeface="Times New Roman" panose="02020603050405020304" pitchFamily="18" charset="0"/>
                 <a:cs typeface="Times New Roman" panose="02020603050405020304" pitchFamily="18" charset="0"/>
               </a:rPr>
-              <a:t>The system depends on mask quality to achieve higher quality reconstruction</a:t>
-            </a:r>
-          </a:p>
-          <a:p>
-            <a:pPr marL="285750" indent="-285750">
-              <a:buFont typeface="Arial" panose="020B0604020202020204" pitchFamily="34" charset="0"/>
-              <a:buChar char="•"/>
-            </a:pPr>
-            <a:r>
-              <a:rPr lang="en-US" dirty="0">
-                <a:latin typeface="Times New Roman" panose="02020603050405020304" pitchFamily="18" charset="0"/>
-                <a:cs typeface="Times New Roman" panose="02020603050405020304" pitchFamily="18" charset="0"/>
-              </a:rPr>
-              <a:t>Simple scene design</a:t>
-            </a:r>
-          </a:p>
-        </p:txBody>
-      </p:sp>
-      <p:sp>
-        <p:nvSpPr>
-          <p:cNvPr id="4" name="TextBox 3">
+              <a:t>Training Insights</a:t>
+            </a:r>
+          </a:p>
+        </p:txBody>
+      </p:sp>
+      <p:pic>
+        <p:nvPicPr>
+          <p:cNvPr id="4" name="Picture 3" descr="training_loss.png"/>
+          <p:cNvPicPr>
+            <a:picLocks noChangeAspect="1"/>
+          </p:cNvPicPr>
+          <p:nvPr/>
+        </p:nvPicPr>
+        <p:blipFill>
+          <a:blip r:embed="rId2"/>
+          <a:stretch>
+            <a:fillRect/>
+          </a:stretch>
+        </p:blipFill>
+        <p:spPr>
+          <a:xfrm>
+            <a:off x="914400" y="1371600"/>
+            <a:ext cx="10058400" cy="3657600"/>
+          </a:xfrm>
+          <a:prstGeom prst="rect">
+            <a:avLst/>
+          </a:prstGeom>
+        </p:spPr>
+      </p:pic>
+      <p:sp>
+        <p:nvSpPr>
+          <p:cNvPr id="5" name="TextBox 4">
             <a:extLst>
               <a:ext uri="{FF2B5EF4-FFF2-40B4-BE49-F238E27FC236}">
-                <a16:creationId xmlns:a16="http://schemas.microsoft.com/office/drawing/2014/main" id="{6F7E78CD-42E2-4858-82C2-F86BCE97FD8E}"/>
+                <a16:creationId xmlns:a16="http://schemas.microsoft.com/office/drawing/2014/main" id="{03631939-EB7C-4C6D-B5F9-306995514A93}"/>
               </a:ext>
             </a:extLst>
           </p:cNvPr>
@@ -7913,8 +9121,8 @@
         </p:nvSpPr>
         <p:spPr>
           <a:xfrm>
-            <a:off x="1632880" y="3938588"/>
-            <a:ext cx="8415337" cy="646331"/>
+            <a:off x="9101138" y="243959"/>
+            <a:ext cx="3043237" cy="369332"/>
           </a:xfrm>
           <a:prstGeom prst="rect">
             <a:avLst/>
@@ -7927,26 +9135,20 @@
           </a:bodyPr>
           <a:lstStyle/>
           <a:p>
-            <a:pPr marL="285750" indent="-285750">
-              <a:buFont typeface="Arial" panose="020B0604020202020204" pitchFamily="34" charset="0"/>
-              <a:buChar char="•"/>
-            </a:pPr>
-            <a:r>
-              <a:rPr lang="en-US" dirty="0">
-                <a:latin typeface="Times New Roman" panose="02020603050405020304" pitchFamily="18" charset="0"/>
-                <a:cs typeface="Times New Roman" panose="02020603050405020304" pitchFamily="18" charset="0"/>
-              </a:rPr>
-              <a:t>We hope to apply this knowledge to spontaneous robot data as obtained in the field or through experimentation.</a:t>
-            </a:r>
-          </a:p>
-        </p:txBody>
-      </p:sp>
-      <p:sp>
-        <p:nvSpPr>
-          <p:cNvPr id="5" name="TextBox 4">
+            <a:pPr algn="ctr"/>
+            <a:r>
+              <a:rPr lang="en-US" dirty="0"/>
+              <a:t>ITMO UNIVERSITY</a:t>
+            </a:r>
+          </a:p>
+        </p:txBody>
+      </p:sp>
+      <p:sp>
+        <p:nvSpPr>
+          <p:cNvPr id="2" name="TextBox 1">
             <a:extLst>
               <a:ext uri="{FF2B5EF4-FFF2-40B4-BE49-F238E27FC236}">
-                <a16:creationId xmlns:a16="http://schemas.microsoft.com/office/drawing/2014/main" id="{471D94D5-9C70-4B39-AA88-3A5F146CFBE5}"/>
+                <a16:creationId xmlns:a16="http://schemas.microsoft.com/office/drawing/2014/main" id="{4A153CC2-15E1-4462-918A-F1F25EE5B627}"/>
               </a:ext>
             </a:extLst>
           </p:cNvPr>
@@ -7955,8 +9157,8 @@
         </p:nvSpPr>
         <p:spPr>
           <a:xfrm>
-            <a:off x="2050256" y="3150156"/>
-            <a:ext cx="7315200" cy="584775"/>
+            <a:off x="2557463" y="5700713"/>
+            <a:ext cx="7629525" cy="369332"/>
           </a:xfrm>
           <a:prstGeom prst="rect">
             <a:avLst/>
@@ -7969,23 +9171,14 @@
           </a:bodyPr>
           <a:lstStyle/>
           <a:p>
-            <a:pPr algn="ctr"/>
-            <a:r>
-              <a:rPr lang="en-US" sz="3200" b="1" dirty="0">
-                <a:latin typeface="Times New Roman" panose="02020603050405020304" pitchFamily="18" charset="0"/>
-                <a:cs typeface="Times New Roman" panose="02020603050405020304" pitchFamily="18" charset="0"/>
-              </a:rPr>
-              <a:t>3.5: Future work</a:t>
+            <a:r>
+              <a:rPr lang="en-US" dirty="0"/>
+              <a:t>Fig. 3.3: TRAINING Losses Across Strategies</a:t>
             </a:r>
           </a:p>
         </p:txBody>
       </p:sp>
     </p:spTree>
-    <p:extLst>
-      <p:ext uri="{BB962C8B-B14F-4D97-AF65-F5344CB8AC3E}">
-        <p14:creationId xmlns:p14="http://schemas.microsoft.com/office/powerpoint/2010/main" val="1704270203"/>
-      </p:ext>
-    </p:extLst>
   </p:cSld>
   <p:clrMapOvr>
     <a:masterClrMapping/>
@@ -8018,7 +9211,7 @@
         </p:nvSpPr>
         <p:spPr>
           <a:xfrm>
-            <a:off x="4793456" y="457200"/>
+            <a:off x="4312046" y="243959"/>
             <a:ext cx="3564732" cy="584775"/>
           </a:xfrm>
           <a:prstGeom prst="rect">
@@ -8071,7 +9264,7 @@
         </p:nvSpPr>
         <p:spPr>
           <a:xfrm>
-            <a:off x="457200" y="1371600"/>
+            <a:off x="501650" y="1100167"/>
             <a:ext cx="11687175" cy="1631216"/>
           </a:xfrm>
           <a:prstGeom prst="rect">
@@ -8091,14 +9284,14 @@
               <a:defRPr sz="2000" b="0"/>
             </a:pPr>
             <a:r>
-              <a:rPr sz="2000" dirty="0">
+              <a:rPr dirty="0">
                 <a:latin typeface="Times New Roman" panose="02020603050405020304" pitchFamily="18" charset="0"/>
                 <a:cs typeface="Times New Roman" panose="02020603050405020304" pitchFamily="18" charset="0"/>
               </a:rPr>
               <a:t>Gradient masking and ray filtering reduce dynamic object artifacts</a:t>
             </a:r>
             <a:r>
-              <a:rPr lang="en-US" sz="2000" dirty="0">
+              <a:rPr lang="en-US" dirty="0">
                 <a:latin typeface="Times New Roman" panose="02020603050405020304" pitchFamily="18" charset="0"/>
                 <a:cs typeface="Times New Roman" panose="02020603050405020304" pitchFamily="18" charset="0"/>
               </a:rPr>
@@ -8112,14 +9305,14 @@
               <a:defRPr sz="2000" b="0"/>
             </a:pPr>
             <a:r>
-              <a:rPr sz="2000" dirty="0">
+              <a:rPr dirty="0">
                 <a:latin typeface="Times New Roman" panose="02020603050405020304" pitchFamily="18" charset="0"/>
                 <a:cs typeface="Times New Roman" panose="02020603050405020304" pitchFamily="18" charset="0"/>
               </a:rPr>
               <a:t>Baseline achieves highest metrics </a:t>
             </a:r>
             <a:r>
-              <a:rPr lang="en-US" sz="2000" dirty="0">
+              <a:rPr lang="en-US" dirty="0">
                 <a:latin typeface="Times New Roman" panose="02020603050405020304" pitchFamily="18" charset="0"/>
                 <a:cs typeface="Times New Roman" panose="02020603050405020304" pitchFamily="18" charset="0"/>
               </a:rPr>
@@ -8133,14 +9326,14 @@
               <a:defRPr sz="2000" b="0"/>
             </a:pPr>
             <a:r>
-              <a:rPr sz="2000" dirty="0">
+              <a:rPr dirty="0">
                 <a:latin typeface="Times New Roman" panose="02020603050405020304" pitchFamily="18" charset="0"/>
                 <a:cs typeface="Times New Roman" panose="02020603050405020304" pitchFamily="18" charset="0"/>
               </a:rPr>
               <a:t>Gradient masking slightly better perceptually than ray filtering</a:t>
             </a:r>
             <a:r>
-              <a:rPr lang="en-US" sz="2000" dirty="0">
+              <a:rPr lang="en-US" dirty="0">
                 <a:latin typeface="Times New Roman" panose="02020603050405020304" pitchFamily="18" charset="0"/>
                 <a:cs typeface="Times New Roman" panose="02020603050405020304" pitchFamily="18" charset="0"/>
               </a:rPr>
@@ -8154,7 +9347,7 @@
               <a:defRPr sz="2000" b="0"/>
             </a:pPr>
             <a:r>
-              <a:rPr lang="en-US" sz="2000" dirty="0">
+              <a:rPr lang="en-US" dirty="0">
                 <a:latin typeface="Times New Roman" panose="02020603050405020304" pitchFamily="18" charset="0"/>
                 <a:cs typeface="Times New Roman" panose="02020603050405020304" pitchFamily="18" charset="0"/>
               </a:rPr>
@@ -8168,7 +9361,7 @@
               <a:defRPr sz="2000" b="0"/>
             </a:pPr>
             <a:r>
-              <a:rPr lang="en-US" sz="2000" dirty="0">
+              <a:rPr lang="en-US" dirty="0">
                 <a:latin typeface="Times New Roman" panose="02020603050405020304" pitchFamily="18" charset="0"/>
                 <a:cs typeface="Times New Roman" panose="02020603050405020304" pitchFamily="18" charset="0"/>
               </a:rPr>
@@ -8209,6 +9402,138 @@
             <a:r>
               <a:rPr lang="en-US" dirty="0"/>
               <a:t>ITMO UNIVERSITY</a:t>
+            </a:r>
+          </a:p>
+        </p:txBody>
+      </p:sp>
+      <p:sp>
+        <p:nvSpPr>
+          <p:cNvPr id="5" name="TextBox 4">
+            <a:extLst>
+              <a:ext uri="{FF2B5EF4-FFF2-40B4-BE49-F238E27FC236}">
+                <a16:creationId xmlns:a16="http://schemas.microsoft.com/office/drawing/2014/main" id="{541C71AD-0452-4680-ACE7-9AEF9790933A}"/>
+              </a:ext>
+            </a:extLst>
+          </p:cNvPr>
+          <p:cNvSpPr txBox="1"/>
+          <p:nvPr/>
+        </p:nvSpPr>
+        <p:spPr>
+          <a:xfrm>
+            <a:off x="501650" y="2810865"/>
+            <a:ext cx="8415337" cy="1200329"/>
+          </a:xfrm>
+          <a:prstGeom prst="rect">
+            <a:avLst/>
+          </a:prstGeom>
+          <a:noFill/>
+        </p:spPr>
+        <p:txBody>
+          <a:bodyPr wrap="square" rtlCol="0">
+            <a:spAutoFit/>
+          </a:bodyPr>
+          <a:lstStyle/>
+          <a:p>
+            <a:pPr algn="ctr"/>
+            <a:r>
+              <a:rPr lang="en-US" b="1" dirty="0">
+                <a:latin typeface="Times New Roman" panose="02020603050405020304" pitchFamily="18" charset="0"/>
+                <a:cs typeface="Times New Roman" panose="02020603050405020304" pitchFamily="18" charset="0"/>
+              </a:rPr>
+              <a:t>3.4: Limitations</a:t>
+            </a:r>
+          </a:p>
+          <a:p>
+            <a:pPr marL="285750" indent="-285750">
+              <a:buFont typeface="Arial" panose="020B0604020202020204" pitchFamily="34" charset="0"/>
+              <a:buChar char="•"/>
+            </a:pPr>
+            <a:r>
+              <a:rPr lang="en-US" dirty="0">
+                <a:latin typeface="Times New Roman" panose="02020603050405020304" pitchFamily="18" charset="0"/>
+                <a:cs typeface="Times New Roman" panose="02020603050405020304" pitchFamily="18" charset="0"/>
+              </a:rPr>
+              <a:t>This work was carried out using synthetic data</a:t>
+            </a:r>
+          </a:p>
+          <a:p>
+            <a:pPr marL="285750" indent="-285750">
+              <a:buFont typeface="Arial" panose="020B0604020202020204" pitchFamily="34" charset="0"/>
+              <a:buChar char="•"/>
+            </a:pPr>
+            <a:r>
+              <a:rPr lang="en-US" dirty="0">
+                <a:latin typeface="Times New Roman" panose="02020603050405020304" pitchFamily="18" charset="0"/>
+                <a:cs typeface="Times New Roman" panose="02020603050405020304" pitchFamily="18" charset="0"/>
+              </a:rPr>
+              <a:t>The system depends on mask quality to achieve higher quality reconstruction</a:t>
+            </a:r>
+          </a:p>
+          <a:p>
+            <a:pPr marL="285750" indent="-285750">
+              <a:buFont typeface="Arial" panose="020B0604020202020204" pitchFamily="34" charset="0"/>
+              <a:buChar char="•"/>
+            </a:pPr>
+            <a:r>
+              <a:rPr lang="en-US" dirty="0">
+                <a:latin typeface="Times New Roman" panose="02020603050405020304" pitchFamily="18" charset="0"/>
+                <a:cs typeface="Times New Roman" panose="02020603050405020304" pitchFamily="18" charset="0"/>
+              </a:rPr>
+              <a:t>Simple scene design</a:t>
+            </a:r>
+          </a:p>
+        </p:txBody>
+      </p:sp>
+      <p:sp>
+        <p:nvSpPr>
+          <p:cNvPr id="7" name="TextBox 6">
+            <a:extLst>
+              <a:ext uri="{FF2B5EF4-FFF2-40B4-BE49-F238E27FC236}">
+                <a16:creationId xmlns:a16="http://schemas.microsoft.com/office/drawing/2014/main" id="{62070C51-DCE4-45BA-AAE3-B5F32134557F}"/>
+              </a:ext>
+            </a:extLst>
+          </p:cNvPr>
+          <p:cNvSpPr txBox="1"/>
+          <p:nvPr/>
+        </p:nvSpPr>
+        <p:spPr>
+          <a:xfrm>
+            <a:off x="501649" y="3938588"/>
+            <a:ext cx="8415337" cy="1200329"/>
+          </a:xfrm>
+          <a:prstGeom prst="rect">
+            <a:avLst/>
+          </a:prstGeom>
+          <a:noFill/>
+        </p:spPr>
+        <p:txBody>
+          <a:bodyPr wrap="square" rtlCol="0">
+            <a:spAutoFit/>
+          </a:bodyPr>
+          <a:lstStyle/>
+          <a:p>
+            <a:pPr algn="ctr"/>
+            <a:r>
+              <a:rPr lang="en-US" b="1" dirty="0">
+                <a:latin typeface="Times New Roman" panose="02020603050405020304" pitchFamily="18" charset="0"/>
+                <a:cs typeface="Times New Roman" panose="02020603050405020304" pitchFamily="18" charset="0"/>
+              </a:rPr>
+              <a:t>3.5: Future work</a:t>
+            </a:r>
+          </a:p>
+          <a:p>
+            <a:endParaRPr lang="en-US" dirty="0">
+              <a:latin typeface="Times New Roman" panose="02020603050405020304" pitchFamily="18" charset="0"/>
+              <a:cs typeface="Times New Roman" panose="02020603050405020304" pitchFamily="18" charset="0"/>
+            </a:endParaRPr>
+          </a:p>
+          <a:p>
+            <a:r>
+              <a:rPr lang="en-US" dirty="0">
+                <a:latin typeface="Times New Roman" panose="02020603050405020304" pitchFamily="18" charset="0"/>
+                <a:cs typeface="Times New Roman" panose="02020603050405020304" pitchFamily="18" charset="0"/>
+              </a:rPr>
+              <a:t>We hope to apply this knowledge to spontaneous robot data as obtained in the field or through experimentation.</a:t>
             </a:r>
           </a:p>
         </p:txBody>
@@ -10511,7 +11836,7 @@
                 <a:avLst/>
               </a:prstGeom>
               <a:blipFill>
-                <a:blip r:embed="rId2"/>
+                <a:blip r:embed="rId3"/>
                 <a:stretch>
                   <a:fillRect t="-524"/>
                 </a:stretch>
@@ -10582,8 +11907,8 @@
         </p:nvSpPr>
         <p:spPr>
           <a:xfrm>
-            <a:off x="8443913" y="1814513"/>
-            <a:ext cx="3557587" cy="600164"/>
+            <a:off x="345039" y="1932342"/>
+            <a:ext cx="3557587" cy="646331"/>
           </a:xfrm>
           <a:prstGeom prst="rect">
             <a:avLst/>
@@ -10597,17 +11922,26 @@
           <a:lstStyle/>
           <a:p>
             <a:r>
-              <a:rPr lang="en-US" sz="1100" dirty="0"/>
+              <a:rPr lang="en-US" sz="1200" dirty="0">
+                <a:latin typeface="Times New Roman" panose="02020603050405020304" pitchFamily="18" charset="0"/>
+                <a:cs typeface="Times New Roman" panose="02020603050405020304" pitchFamily="18" charset="0"/>
+              </a:rPr>
               <a:t>L = maximum possible pixel value of the image (e.g., 1.0 if normalized, 255 if 8-bit)</a:t>
             </a:r>
           </a:p>
           <a:p>
             <a:r>
-              <a:rPr lang="en-US" sz="1100" b="1" dirty="0"/>
+              <a:rPr lang="en-US" sz="1200" b="1" dirty="0">
+                <a:latin typeface="Times New Roman" panose="02020603050405020304" pitchFamily="18" charset="0"/>
+                <a:cs typeface="Times New Roman" panose="02020603050405020304" pitchFamily="18" charset="0"/>
+              </a:rPr>
               <a:t>MSE</a:t>
             </a:r>
             <a:r>
-              <a:rPr lang="en-US" sz="1100" dirty="0"/>
+              <a:rPr lang="en-US" sz="1200" dirty="0">
+                <a:latin typeface="Times New Roman" panose="02020603050405020304" pitchFamily="18" charset="0"/>
+                <a:cs typeface="Times New Roman" panose="02020603050405020304" pitchFamily="18" charset="0"/>
+              </a:rPr>
               <a:t>=BTW predicted and ground truth images:</a:t>
             </a:r>
           </a:p>
@@ -10627,8 +11961,8 @@
         </p:nvSpPr>
         <p:spPr>
           <a:xfrm>
-            <a:off x="8905230" y="3280915"/>
-            <a:ext cx="2810520" cy="1277273"/>
+            <a:off x="8593288" y="2807470"/>
+            <a:ext cx="3334300" cy="1600438"/>
           </a:xfrm>
           <a:prstGeom prst="rect">
             <a:avLst/>
@@ -10642,58 +11976,94 @@
           <a:lstStyle/>
           <a:p>
             <a:r>
-              <a:rPr lang="en-US" sz="1100" b="1" dirty="0"/>
+              <a:rPr lang="en-US" sz="1400" b="1" dirty="0">
+                <a:latin typeface="Times New Roman" panose="02020603050405020304" pitchFamily="18" charset="0"/>
+                <a:cs typeface="Times New Roman" panose="02020603050405020304" pitchFamily="18" charset="0"/>
+              </a:rPr>
               <a:t>x, y </a:t>
             </a:r>
             <a:r>
-              <a:rPr lang="en-US" sz="1100" dirty="0"/>
+              <a:rPr lang="en-US" sz="1400" dirty="0">
+                <a:latin typeface="Times New Roman" panose="02020603050405020304" pitchFamily="18" charset="0"/>
+                <a:cs typeface="Times New Roman" panose="02020603050405020304" pitchFamily="18" charset="0"/>
+              </a:rPr>
               <a:t>= local patches of predicted and ground truth images</a:t>
             </a:r>
           </a:p>
           <a:p>
             <a:r>
-              <a:rPr lang="en-US" sz="1100" b="1" dirty="0" err="1"/>
+              <a:rPr lang="en-US" sz="1400" b="1" dirty="0" err="1">
+                <a:latin typeface="Times New Roman" panose="02020603050405020304" pitchFamily="18" charset="0"/>
+                <a:cs typeface="Times New Roman" panose="02020603050405020304" pitchFamily="18" charset="0"/>
+              </a:rPr>
               <a:t>μx</a:t>
             </a:r>
             <a:r>
-              <a:rPr lang="en-US" sz="1100" b="1" dirty="0"/>
+              <a:rPr lang="en-US" sz="1400" b="1" dirty="0">
+                <a:latin typeface="Times New Roman" panose="02020603050405020304" pitchFamily="18" charset="0"/>
+                <a:cs typeface="Times New Roman" panose="02020603050405020304" pitchFamily="18" charset="0"/>
+              </a:rPr>
               <a:t>​, </a:t>
             </a:r>
             <a:r>
-              <a:rPr lang="en-US" sz="1100" b="1" dirty="0" err="1"/>
+              <a:rPr lang="en-US" sz="1400" b="1" dirty="0" err="1">
+                <a:latin typeface="Times New Roman" panose="02020603050405020304" pitchFamily="18" charset="0"/>
+                <a:cs typeface="Times New Roman" panose="02020603050405020304" pitchFamily="18" charset="0"/>
+              </a:rPr>
               <a:t>μy</a:t>
             </a:r>
             <a:r>
-              <a:rPr lang="en-US" sz="1100" dirty="0"/>
-              <a:t>​ = mean intensity of x and y</a:t>
-            </a:r>
-          </a:p>
-          <a:p>
-            <a:r>
-              <a:rPr lang="en-US" sz="1100" b="1" dirty="0"/>
+              <a:rPr lang="en-US" sz="1400" dirty="0">
+                <a:latin typeface="Times New Roman" panose="02020603050405020304" pitchFamily="18" charset="0"/>
+                <a:cs typeface="Times New Roman" panose="02020603050405020304" pitchFamily="18" charset="0"/>
+              </a:rPr>
+              <a:t>​ = mean pixel intensity of x and y</a:t>
+            </a:r>
+          </a:p>
+          <a:p>
+            <a:r>
+              <a:rPr lang="en-US" sz="1400" b="1" dirty="0">
+                <a:latin typeface="Times New Roman" panose="02020603050405020304" pitchFamily="18" charset="0"/>
+                <a:cs typeface="Times New Roman" panose="02020603050405020304" pitchFamily="18" charset="0"/>
+              </a:rPr>
               <a:t>σx2​,σy2</a:t>
             </a:r>
             <a:r>
-              <a:rPr lang="en-US" sz="1100" dirty="0"/>
+              <a:rPr lang="en-US" sz="1400" dirty="0">
+                <a:latin typeface="Times New Roman" panose="02020603050405020304" pitchFamily="18" charset="0"/>
+                <a:cs typeface="Times New Roman" panose="02020603050405020304" pitchFamily="18" charset="0"/>
+              </a:rPr>
               <a:t>​ = variance of x and y</a:t>
             </a:r>
           </a:p>
           <a:p>
             <a:r>
-              <a:rPr lang="en-US" sz="1100" b="1" dirty="0" err="1"/>
+              <a:rPr lang="en-US" sz="1400" b="1" dirty="0" err="1">
+                <a:latin typeface="Times New Roman" panose="02020603050405020304" pitchFamily="18" charset="0"/>
+                <a:cs typeface="Times New Roman" panose="02020603050405020304" pitchFamily="18" charset="0"/>
+              </a:rPr>
               <a:t>σxy</a:t>
             </a:r>
             <a:r>
-              <a:rPr lang="en-US" sz="1100" dirty="0"/>
+              <a:rPr lang="en-US" sz="1400" dirty="0">
+                <a:latin typeface="Times New Roman" panose="02020603050405020304" pitchFamily="18" charset="0"/>
+                <a:cs typeface="Times New Roman" panose="02020603050405020304" pitchFamily="18" charset="0"/>
+              </a:rPr>
               <a:t>​ = covariance between x and y</a:t>
             </a:r>
           </a:p>
           <a:p>
-            <a:endParaRPr lang="en-US" sz="1100" dirty="0"/>
-          </a:p>
-          <a:p>
-            <a:r>
-              <a:rPr lang="en-US" sz="1100" dirty="0"/>
+            <a:endParaRPr lang="en-US" sz="1400" dirty="0">
+              <a:latin typeface="Times New Roman" panose="02020603050405020304" pitchFamily="18" charset="0"/>
+              <a:cs typeface="Times New Roman" panose="02020603050405020304" pitchFamily="18" charset="0"/>
+            </a:endParaRPr>
+          </a:p>
+          <a:p>
+            <a:r>
+              <a:rPr lang="en-US" sz="1400" dirty="0">
+                <a:latin typeface="Times New Roman" panose="02020603050405020304" pitchFamily="18" charset="0"/>
+                <a:cs typeface="Times New Roman" panose="02020603050405020304" pitchFamily="18" charset="0"/>
+              </a:rPr>
               <a:t>Others= Stabilization constants</a:t>
             </a:r>
           </a:p>
@@ -10715,8 +12085,8 @@
             </p:nvSpPr>
             <p:spPr>
               <a:xfrm>
-                <a:off x="223288" y="4913091"/>
-                <a:ext cx="4493855" cy="1175194"/>
+                <a:off x="261237" y="4113223"/>
+                <a:ext cx="3334300" cy="1388329"/>
               </a:xfrm>
               <a:prstGeom prst="rect">
                 <a:avLst/>
@@ -10730,16 +12100,25 @@
               <a:lstStyle/>
               <a:p>
                 <a:r>
-                  <a:rPr lang="en-US" sz="1000" i="1" dirty="0"/>
+                  <a:rPr lang="en-US" sz="1200" i="1" dirty="0">
+                    <a:latin typeface="Times New Roman" panose="02020603050405020304" pitchFamily="18" charset="0"/>
+                    <a:cs typeface="Times New Roman" panose="02020603050405020304" pitchFamily="18" charset="0"/>
+                  </a:rPr>
                   <a:t>x, y </a:t>
                 </a:r>
                 <a:r>
-                  <a:rPr lang="en-US" sz="1000" dirty="0"/>
+                  <a:rPr lang="en-US" sz="1200" dirty="0">
+                    <a:latin typeface="Times New Roman" panose="02020603050405020304" pitchFamily="18" charset="0"/>
+                    <a:cs typeface="Times New Roman" panose="02020603050405020304" pitchFamily="18" charset="0"/>
+                  </a:rPr>
                   <a:t>= images</a:t>
                 </a:r>
               </a:p>
               <a:p>
-                <a:endParaRPr lang="en-US" sz="1000" dirty="0"/>
+                <a:endParaRPr lang="en-US" sz="1200" dirty="0">
+                  <a:latin typeface="Times New Roman" panose="02020603050405020304" pitchFamily="18" charset="0"/>
+                  <a:cs typeface="Times New Roman" panose="02020603050405020304" pitchFamily="18" charset="0"/>
+                </a:endParaRPr>
               </a:p>
               <a:p>
                 <a:pPr/>
@@ -10752,7 +12131,7 @@
                       <m:sSup>
                         <m:sSupPr>
                           <m:ctrlPr>
-                            <a:rPr lang="en-US" sz="1000" i="1">
+                            <a:rPr lang="en-US" sz="1200" i="1">
                               <a:latin typeface="Cambria Math" panose="02040503050406030204" pitchFamily="18" charset="0"/>
                             </a:rPr>
                           </m:ctrlPr>
@@ -10762,14 +12141,14 @@
                             <m:accPr>
                               <m:chr m:val="̂"/>
                               <m:ctrlPr>
-                                <a:rPr lang="en-US" sz="1000" i="1">
+                                <a:rPr lang="en-US" sz="1200" i="1">
                                   <a:latin typeface="Cambria Math" panose="02040503050406030204" pitchFamily="18" charset="0"/>
                                 </a:rPr>
                               </m:ctrlPr>
                             </m:accPr>
                             <m:e>
                               <m:r>
-                                <a:rPr lang="en-US" sz="1000" i="1">
+                                <a:rPr lang="en-US" sz="1200" i="1">
                                   <a:latin typeface="Cambria Math" panose="02040503050406030204" pitchFamily="18" charset="0"/>
                                 </a:rPr>
                                 <m:t>𝑥</m:t>
@@ -10779,7 +12158,7 @@
                         </m:e>
                         <m:sup>
                           <m:r>
-                            <a:rPr lang="en-US" sz="1000" i="1">
+                            <a:rPr lang="en-US" sz="1200" i="1">
                               <a:latin typeface="Cambria Math" panose="02040503050406030204" pitchFamily="18" charset="0"/>
                             </a:rPr>
                             <m:t>𝑙</m:t>
@@ -10787,7 +12166,7 @@
                         </m:sup>
                       </m:sSup>
                       <m:r>
-                        <a:rPr lang="en-US" sz="1000" i="1">
+                        <a:rPr lang="en-US" sz="1200" i="1">
                           <a:latin typeface="Cambria Math" panose="02040503050406030204" pitchFamily="18" charset="0"/>
                         </a:rPr>
                         <m:t>, </m:t>
@@ -10795,7 +12174,7 @@
                       <m:sSup>
                         <m:sSupPr>
                           <m:ctrlPr>
-                            <a:rPr lang="en-US" sz="1000" i="1">
+                            <a:rPr lang="en-US" sz="1200" i="1">
                               <a:latin typeface="Cambria Math" panose="02040503050406030204" pitchFamily="18" charset="0"/>
                             </a:rPr>
                           </m:ctrlPr>
@@ -10805,14 +12184,14 @@
                             <m:accPr>
                               <m:chr m:val="̂"/>
                               <m:ctrlPr>
-                                <a:rPr lang="en-US" sz="1000" i="1">
+                                <a:rPr lang="en-US" sz="1200" i="1">
                                   <a:latin typeface="Cambria Math" panose="02040503050406030204" pitchFamily="18" charset="0"/>
                                 </a:rPr>
                               </m:ctrlPr>
                             </m:accPr>
                             <m:e>
                               <m:r>
-                                <a:rPr lang="en-US" sz="1000" i="1">
+                                <a:rPr lang="en-US" sz="1200" i="1">
                                   <a:latin typeface="Cambria Math" panose="02040503050406030204" pitchFamily="18" charset="0"/>
                                 </a:rPr>
                                 <m:t>𝑦</m:t>
@@ -10822,7 +12201,7 @@
                         </m:e>
                         <m:sup>
                           <m:r>
-                            <a:rPr lang="en-US" sz="1000" i="1">
+                            <a:rPr lang="en-US" sz="1200" i="1">
                               <a:latin typeface="Cambria Math" panose="02040503050406030204" pitchFamily="18" charset="0"/>
                             </a:rPr>
                             <m:t>𝑙</m:t>
@@ -10830,7 +12209,7 @@
                         </m:sup>
                       </m:sSup>
                       <m:r>
-                        <a:rPr lang="en-US" sz="1000" b="0" i="1" smtClean="0">
+                        <a:rPr lang="en-US" sz="1200" b="0" i="1" smtClean="0">
                           <a:latin typeface="Cambria Math" panose="02040503050406030204" pitchFamily="18" charset="0"/>
                         </a:rPr>
                         <m:t>:</m:t>
@@ -10839,13 +12218,13 @@
                         <m:rPr>
                           <m:sty m:val="p"/>
                         </m:rPr>
-                        <a:rPr lang="en-US" sz="1000">
+                        <a:rPr lang="en-US" sz="1200">
                           <a:latin typeface="Cambria Math" panose="02040503050406030204" pitchFamily="18" charset="0"/>
                         </a:rPr>
                         <m:t>feature</m:t>
                       </m:r>
                       <m:r>
-                        <a:rPr lang="en-US" sz="1000">
+                        <a:rPr lang="en-US" sz="1200">
                           <a:latin typeface="Cambria Math" panose="02040503050406030204" pitchFamily="18" charset="0"/>
                         </a:rPr>
                         <m:t> </m:t>
@@ -10854,13 +12233,13 @@
                         <m:rPr>
                           <m:sty m:val="p"/>
                         </m:rPr>
-                        <a:rPr lang="en-US" sz="1000">
+                        <a:rPr lang="en-US" sz="1200">
                           <a:latin typeface="Cambria Math" panose="02040503050406030204" pitchFamily="18" charset="0"/>
                         </a:rPr>
                         <m:t>activations</m:t>
                       </m:r>
                       <m:r>
-                        <a:rPr lang="en-US" sz="1000">
+                        <a:rPr lang="en-US" sz="1200">
                           <a:latin typeface="Cambria Math" panose="02040503050406030204" pitchFamily="18" charset="0"/>
                         </a:rPr>
                         <m:t> </m:t>
@@ -10869,13 +12248,13 @@
                         <m:rPr>
                           <m:sty m:val="p"/>
                         </m:rPr>
-                        <a:rPr lang="en-US" sz="1000">
+                        <a:rPr lang="en-US" sz="1200">
                           <a:latin typeface="Cambria Math" panose="02040503050406030204" pitchFamily="18" charset="0"/>
                         </a:rPr>
                         <m:t>of</m:t>
                       </m:r>
                       <m:r>
-                        <a:rPr lang="en-US" sz="1000">
+                        <a:rPr lang="en-US" sz="1200">
                           <a:latin typeface="Cambria Math" panose="02040503050406030204" pitchFamily="18" charset="0"/>
                         </a:rPr>
                         <m:t> </m:t>
@@ -10884,13 +12263,13 @@
                         <m:rPr>
                           <m:sty m:val="p"/>
                         </m:rPr>
-                        <a:rPr lang="en-US" sz="1000">
+                        <a:rPr lang="en-US" sz="1200">
                           <a:latin typeface="Cambria Math" panose="02040503050406030204" pitchFamily="18" charset="0"/>
                         </a:rPr>
                         <m:t>a</m:t>
                       </m:r>
                       <m:r>
-                        <a:rPr lang="en-US" sz="1000">
+                        <a:rPr lang="en-US" sz="1200">
                           <a:latin typeface="Cambria Math" panose="02040503050406030204" pitchFamily="18" charset="0"/>
                         </a:rPr>
                         <m:t> </m:t>
@@ -10899,13 +12278,13 @@
                         <m:rPr>
                           <m:sty m:val="p"/>
                         </m:rPr>
-                        <a:rPr lang="en-US" sz="1000">
+                        <a:rPr lang="en-US" sz="1200">
                           <a:latin typeface="Cambria Math" panose="02040503050406030204" pitchFamily="18" charset="0"/>
                         </a:rPr>
                         <m:t>pretrained</m:t>
                       </m:r>
                       <m:r>
-                        <a:rPr lang="en-US" sz="1000">
+                        <a:rPr lang="en-US" sz="1200">
                           <a:latin typeface="Cambria Math" panose="02040503050406030204" pitchFamily="18" charset="0"/>
                         </a:rPr>
                         <m:t> </m:t>
@@ -10914,13 +12293,13 @@
                         <m:rPr>
                           <m:sty m:val="p"/>
                         </m:rPr>
-                        <a:rPr lang="en-US" sz="1000">
+                        <a:rPr lang="en-US" sz="1200">
                           <a:latin typeface="Cambria Math" panose="02040503050406030204" pitchFamily="18" charset="0"/>
                         </a:rPr>
                         <m:t>network</m:t>
                       </m:r>
                       <m:r>
-                        <a:rPr lang="en-US" sz="1000">
+                        <a:rPr lang="en-US" sz="1200">
                           <a:latin typeface="Cambria Math" panose="02040503050406030204" pitchFamily="18" charset="0"/>
                         </a:rPr>
                         <m:t> (</m:t>
@@ -10929,13 +12308,13 @@
                         <m:rPr>
                           <m:sty m:val="p"/>
                         </m:rPr>
-                        <a:rPr lang="en-US" sz="1000">
+                        <a:rPr lang="en-US" sz="1200">
                           <a:latin typeface="Cambria Math" panose="02040503050406030204" pitchFamily="18" charset="0"/>
                         </a:rPr>
                         <m:t>e</m:t>
                       </m:r>
                       <m:r>
-                        <a:rPr lang="en-US" sz="1000">
+                        <a:rPr lang="en-US" sz="1200">
                           <a:latin typeface="Cambria Math" panose="02040503050406030204" pitchFamily="18" charset="0"/>
                         </a:rPr>
                         <m:t>.</m:t>
@@ -10944,13 +12323,13 @@
                         <m:rPr>
                           <m:sty m:val="p"/>
                         </m:rPr>
-                        <a:rPr lang="en-US" sz="1000">
+                        <a:rPr lang="en-US" sz="1200">
                           <a:latin typeface="Cambria Math" panose="02040503050406030204" pitchFamily="18" charset="0"/>
                         </a:rPr>
                         <m:t>g</m:t>
                       </m:r>
                       <m:r>
-                        <a:rPr lang="en-US" sz="1000">
+                        <a:rPr lang="en-US" sz="1200">
                           <a:latin typeface="Cambria Math" panose="02040503050406030204" pitchFamily="18" charset="0"/>
                         </a:rPr>
                         <m:t>., </m:t>
@@ -10959,13 +12338,13 @@
                         <m:rPr>
                           <m:sty m:val="p"/>
                         </m:rPr>
-                        <a:rPr lang="en-US" sz="1000">
+                        <a:rPr lang="en-US" sz="1200">
                           <a:latin typeface="Cambria Math" panose="02040503050406030204" pitchFamily="18" charset="0"/>
                         </a:rPr>
                         <m:t>AlexNet</m:t>
                       </m:r>
                       <m:r>
-                        <a:rPr lang="en-US" sz="1000">
+                        <a:rPr lang="en-US" sz="1200">
                           <a:latin typeface="Cambria Math" panose="02040503050406030204" pitchFamily="18" charset="0"/>
                         </a:rPr>
                         <m:t>, </m:t>
@@ -10974,13 +12353,13 @@
                         <m:rPr>
                           <m:sty m:val="p"/>
                         </m:rPr>
-                        <a:rPr lang="en-US" sz="1000">
+                        <a:rPr lang="en-US" sz="1200">
                           <a:latin typeface="Cambria Math" panose="02040503050406030204" pitchFamily="18" charset="0"/>
                         </a:rPr>
                         <m:t>VGG</m:t>
                       </m:r>
                       <m:r>
-                        <a:rPr lang="en-US" sz="1000">
+                        <a:rPr lang="en-US" sz="1200">
                           <a:latin typeface="Cambria Math" panose="02040503050406030204" pitchFamily="18" charset="0"/>
                         </a:rPr>
                         <m:t>) </m:t>
@@ -10989,13 +12368,13 @@
                         <m:rPr>
                           <m:sty m:val="p"/>
                         </m:rPr>
-                        <a:rPr lang="en-US" sz="1000">
+                        <a:rPr lang="en-US" sz="1200">
                           <a:latin typeface="Cambria Math" panose="02040503050406030204" pitchFamily="18" charset="0"/>
                         </a:rPr>
                         <m:t>at</m:t>
                       </m:r>
                       <m:r>
-                        <a:rPr lang="en-US" sz="1000">
+                        <a:rPr lang="en-US" sz="1200">
                           <a:latin typeface="Cambria Math" panose="02040503050406030204" pitchFamily="18" charset="0"/>
                         </a:rPr>
                         <m:t> </m:t>
@@ -11004,19 +12383,19 @@
                         <m:rPr>
                           <m:sty m:val="p"/>
                         </m:rPr>
-                        <a:rPr lang="en-US" sz="1000">
+                        <a:rPr lang="en-US" sz="1200">
                           <a:latin typeface="Cambria Math" panose="02040503050406030204" pitchFamily="18" charset="0"/>
                         </a:rPr>
                         <m:t>layer</m:t>
                       </m:r>
                       <m:r>
-                        <a:rPr lang="en-US" sz="1000" i="1">
+                        <a:rPr lang="en-US" sz="1200" i="1">
                           <a:latin typeface="Cambria Math" panose="02040503050406030204" pitchFamily="18" charset="0"/>
                         </a:rPr>
                         <m:t> </m:t>
                       </m:r>
                       <m:r>
-                        <a:rPr lang="en-US" sz="1000" i="1">
+                        <a:rPr lang="en-US" sz="1200" i="1">
                           <a:latin typeface="Cambria Math" panose="02040503050406030204" pitchFamily="18" charset="0"/>
                         </a:rPr>
                         <m:t>𝑙</m:t>
@@ -11024,7 +12403,10 @@
                     </m:oMath>
                   </m:oMathPara>
                 </a14:m>
-                <a:endParaRPr lang="en-US" sz="1000" dirty="0"/>
+                <a:endParaRPr lang="en-US" sz="1200" dirty="0">
+                  <a:latin typeface="Times New Roman" panose="02020603050405020304" pitchFamily="18" charset="0"/>
+                  <a:cs typeface="Times New Roman" panose="02020603050405020304" pitchFamily="18" charset="0"/>
+                </a:endParaRPr>
               </a:p>
               <a:p>
                 <a:pPr/>
@@ -11037,14 +12419,14 @@
                       <m:sSub>
                         <m:sSubPr>
                           <m:ctrlPr>
-                            <a:rPr lang="en-US" sz="1000" i="1">
+                            <a:rPr lang="en-US" sz="1200" i="1">
                               <a:latin typeface="Cambria Math" panose="02040503050406030204" pitchFamily="18" charset="0"/>
                             </a:rPr>
                           </m:ctrlPr>
                         </m:sSubPr>
                         <m:e>
                           <m:r>
-                            <a:rPr lang="en-US" sz="1000" i="1">
+                            <a:rPr lang="en-US" sz="1200" i="1">
                               <a:latin typeface="Cambria Math" panose="02040503050406030204" pitchFamily="18" charset="0"/>
                             </a:rPr>
                             <m:t>𝑤</m:t>
@@ -11052,7 +12434,7 @@
                         </m:e>
                         <m:sub>
                           <m:r>
-                            <a:rPr lang="en-US" sz="1000" i="1">
+                            <a:rPr lang="en-US" sz="1200" i="1">
                               <a:latin typeface="Cambria Math" panose="02040503050406030204" pitchFamily="18" charset="0"/>
                             </a:rPr>
                             <m:t>𝑙</m:t>
@@ -11060,7 +12442,7 @@
                         </m:sub>
                       </m:sSub>
                       <m:r>
-                        <a:rPr lang="en-US" sz="1000" i="1">
+                        <a:rPr lang="en-US" sz="1200" i="1">
                           <a:latin typeface="Cambria Math" panose="02040503050406030204" pitchFamily="18" charset="0"/>
                         </a:rPr>
                         <m:t>= </m:t>
@@ -11069,13 +12451,13 @@
                         <m:rPr>
                           <m:sty m:val="p"/>
                         </m:rPr>
-                        <a:rPr lang="en-US" sz="1000">
+                        <a:rPr lang="en-US" sz="1200">
                           <a:latin typeface="Cambria Math" panose="02040503050406030204" pitchFamily="18" charset="0"/>
                         </a:rPr>
                         <m:t>learned</m:t>
                       </m:r>
                       <m:r>
-                        <a:rPr lang="en-US" sz="1000">
+                        <a:rPr lang="en-US" sz="1200">
                           <a:latin typeface="Cambria Math" panose="02040503050406030204" pitchFamily="18" charset="0"/>
                         </a:rPr>
                         <m:t> </m:t>
@@ -11084,13 +12466,13 @@
                         <m:rPr>
                           <m:sty m:val="p"/>
                         </m:rPr>
-                        <a:rPr lang="en-US" sz="1000">
+                        <a:rPr lang="en-US" sz="1200">
                           <a:latin typeface="Cambria Math" panose="02040503050406030204" pitchFamily="18" charset="0"/>
                         </a:rPr>
                         <m:t>per</m:t>
                       </m:r>
                       <m:r>
-                        <a:rPr lang="en-US" sz="1000" i="1">
+                        <a:rPr lang="en-US" sz="1200" i="1">
                           <a:latin typeface="Cambria Math" panose="02040503050406030204" pitchFamily="18" charset="0"/>
                         </a:rPr>
                         <m:t>−</m:t>
@@ -11099,13 +12481,13 @@
                         <m:rPr>
                           <m:sty m:val="p"/>
                         </m:rPr>
-                        <a:rPr lang="en-US" sz="1000">
+                        <a:rPr lang="en-US" sz="1200">
                           <a:latin typeface="Cambria Math" panose="02040503050406030204" pitchFamily="18" charset="0"/>
                         </a:rPr>
                         <m:t>channel</m:t>
                       </m:r>
                       <m:r>
-                        <a:rPr lang="en-US" sz="1000">
+                        <a:rPr lang="en-US" sz="1200">
                           <a:latin typeface="Cambria Math" panose="02040503050406030204" pitchFamily="18" charset="0"/>
                         </a:rPr>
                         <m:t> </m:t>
@@ -11114,13 +12496,13 @@
                         <m:rPr>
                           <m:sty m:val="p"/>
                         </m:rPr>
-                        <a:rPr lang="en-US" sz="1000">
+                        <a:rPr lang="en-US" sz="1200">
                           <a:latin typeface="Cambria Math" panose="02040503050406030204" pitchFamily="18" charset="0"/>
                         </a:rPr>
                         <m:t>weights</m:t>
                       </m:r>
                       <m:r>
-                        <a:rPr lang="en-US" sz="1000">
+                        <a:rPr lang="en-US" sz="1200">
                           <a:latin typeface="Cambria Math" panose="02040503050406030204" pitchFamily="18" charset="0"/>
                         </a:rPr>
                         <m:t> </m:t>
@@ -11129,13 +12511,13 @@
                         <m:rPr>
                           <m:sty m:val="p"/>
                         </m:rPr>
-                        <a:rPr lang="en-US" sz="1000">
+                        <a:rPr lang="en-US" sz="1200">
                           <a:latin typeface="Cambria Math" panose="02040503050406030204" pitchFamily="18" charset="0"/>
                         </a:rPr>
                         <m:t>for</m:t>
                       </m:r>
                       <m:r>
-                        <a:rPr lang="en-US" sz="1000">
+                        <a:rPr lang="en-US" sz="1200">
                           <a:latin typeface="Cambria Math" panose="02040503050406030204" pitchFamily="18" charset="0"/>
                         </a:rPr>
                         <m:t> </m:t>
@@ -11144,19 +12526,19 @@
                         <m:rPr>
                           <m:sty m:val="p"/>
                         </m:rPr>
-                        <a:rPr lang="en-US" sz="1000">
+                        <a:rPr lang="en-US" sz="1200">
                           <a:latin typeface="Cambria Math" panose="02040503050406030204" pitchFamily="18" charset="0"/>
                         </a:rPr>
                         <m:t>layer</m:t>
                       </m:r>
                       <m:r>
-                        <a:rPr lang="en-US" sz="1000">
+                        <a:rPr lang="en-US" sz="1200">
                           <a:latin typeface="Cambria Math" panose="02040503050406030204" pitchFamily="18" charset="0"/>
                         </a:rPr>
                         <m:t> </m:t>
                       </m:r>
                       <m:r>
-                        <a:rPr lang="en-US" sz="1000" i="1">
+                        <a:rPr lang="en-US" sz="1200" i="1">
                           <a:latin typeface="Cambria Math" panose="02040503050406030204" pitchFamily="18" charset="0"/>
                         </a:rPr>
                         <m:t>𝑙</m:t>
@@ -11164,7 +12546,10 @@
                     </m:oMath>
                   </m:oMathPara>
                 </a14:m>
-                <a:endParaRPr lang="en-US" sz="1000" dirty="0"/>
+                <a:endParaRPr lang="en-US" sz="1200" dirty="0">
+                  <a:latin typeface="Times New Roman" panose="02020603050405020304" pitchFamily="18" charset="0"/>
+                  <a:cs typeface="Times New Roman" panose="02020603050405020304" pitchFamily="18" charset="0"/>
+                </a:endParaRPr>
               </a:p>
               <a:p>
                 <a:pPr/>
@@ -11177,14 +12562,14 @@
                       <m:sSub>
                         <m:sSubPr>
                           <m:ctrlPr>
-                            <a:rPr lang="en-US" sz="1000" i="1">
+                            <a:rPr lang="en-US" sz="1200" i="1">
                               <a:latin typeface="Cambria Math" panose="02040503050406030204" pitchFamily="18" charset="0"/>
                             </a:rPr>
                           </m:ctrlPr>
                         </m:sSubPr>
                         <m:e>
                           <m:r>
-                            <a:rPr lang="en-US" sz="1000" i="1">
+                            <a:rPr lang="en-US" sz="1200" i="1">
                               <a:latin typeface="Cambria Math" panose="02040503050406030204" pitchFamily="18" charset="0"/>
                             </a:rPr>
                             <m:t>𝐻</m:t>
@@ -11192,7 +12577,7 @@
                         </m:e>
                         <m:sub>
                           <m:r>
-                            <a:rPr lang="en-US" sz="1000" i="1">
+                            <a:rPr lang="en-US" sz="1200" i="1">
                               <a:latin typeface="Cambria Math" panose="02040503050406030204" pitchFamily="18" charset="0"/>
                             </a:rPr>
                             <m:t>𝑙</m:t>
@@ -11200,7 +12585,7 @@
                         </m:sub>
                       </m:sSub>
                       <m:r>
-                        <a:rPr lang="en-US" sz="1000" i="1">
+                        <a:rPr lang="en-US" sz="1200" i="1">
                           <a:latin typeface="Cambria Math" panose="02040503050406030204" pitchFamily="18" charset="0"/>
                         </a:rPr>
                         <m:t>, </m:t>
@@ -11208,14 +12593,14 @@
                       <m:sSub>
                         <m:sSubPr>
                           <m:ctrlPr>
-                            <a:rPr lang="en-US" sz="1000" i="1">
+                            <a:rPr lang="en-US" sz="1200" i="1">
                               <a:latin typeface="Cambria Math" panose="02040503050406030204" pitchFamily="18" charset="0"/>
                             </a:rPr>
                           </m:ctrlPr>
                         </m:sSubPr>
                         <m:e>
                           <m:r>
-                            <a:rPr lang="en-US" sz="1000" i="1">
+                            <a:rPr lang="en-US" sz="1200" i="1">
                               <a:latin typeface="Cambria Math" panose="02040503050406030204" pitchFamily="18" charset="0"/>
                             </a:rPr>
                             <m:t>𝑊</m:t>
@@ -11223,7 +12608,7 @@
                         </m:e>
                         <m:sub>
                           <m:r>
-                            <a:rPr lang="en-US" sz="1000" i="1">
+                            <a:rPr lang="en-US" sz="1200" i="1">
                               <a:latin typeface="Cambria Math" panose="02040503050406030204" pitchFamily="18" charset="0"/>
                             </a:rPr>
                             <m:t>𝑙</m:t>
@@ -11231,7 +12616,7 @@
                         </m:sub>
                       </m:sSub>
                       <m:r>
-                        <a:rPr lang="en-US" sz="1000" i="1">
+                        <a:rPr lang="en-US" sz="1200" i="1">
                           <a:latin typeface="Cambria Math" panose="02040503050406030204" pitchFamily="18" charset="0"/>
                         </a:rPr>
                         <m:t> = </m:t>
@@ -11240,13 +12625,13 @@
                         <m:rPr>
                           <m:sty m:val="p"/>
                         </m:rPr>
-                        <a:rPr lang="en-US" sz="1000">
+                        <a:rPr lang="en-US" sz="1200">
                           <a:latin typeface="Cambria Math" panose="02040503050406030204" pitchFamily="18" charset="0"/>
                         </a:rPr>
                         <m:t>spatial</m:t>
                       </m:r>
                       <m:r>
-                        <a:rPr lang="en-US" sz="1000">
+                        <a:rPr lang="en-US" sz="1200">
                           <a:latin typeface="Cambria Math" panose="02040503050406030204" pitchFamily="18" charset="0"/>
                         </a:rPr>
                         <m:t> </m:t>
@@ -11255,13 +12640,13 @@
                         <m:rPr>
                           <m:sty m:val="p"/>
                         </m:rPr>
-                        <a:rPr lang="en-US" sz="1000">
+                        <a:rPr lang="en-US" sz="1200">
                           <a:latin typeface="Cambria Math" panose="02040503050406030204" pitchFamily="18" charset="0"/>
                         </a:rPr>
                         <m:t>dimensions</m:t>
                       </m:r>
                       <m:r>
-                        <a:rPr lang="en-US" sz="1000">
+                        <a:rPr lang="en-US" sz="1200">
                           <a:latin typeface="Cambria Math" panose="02040503050406030204" pitchFamily="18" charset="0"/>
                         </a:rPr>
                         <m:t> </m:t>
@@ -11270,13 +12655,13 @@
                         <m:rPr>
                           <m:sty m:val="p"/>
                         </m:rPr>
-                        <a:rPr lang="en-US" sz="1000">
+                        <a:rPr lang="en-US" sz="1200">
                           <a:latin typeface="Cambria Math" panose="02040503050406030204" pitchFamily="18" charset="0"/>
                         </a:rPr>
                         <m:t>of</m:t>
                       </m:r>
                       <m:r>
-                        <a:rPr lang="en-US" sz="1000">
+                        <a:rPr lang="en-US" sz="1200">
                           <a:latin typeface="Cambria Math" panose="02040503050406030204" pitchFamily="18" charset="0"/>
                         </a:rPr>
                         <m:t> </m:t>
@@ -11285,19 +12670,19 @@
                         <m:rPr>
                           <m:sty m:val="p"/>
                         </m:rPr>
-                        <a:rPr lang="en-US" sz="1000">
+                        <a:rPr lang="en-US" sz="1200">
                           <a:latin typeface="Cambria Math" panose="02040503050406030204" pitchFamily="18" charset="0"/>
                         </a:rPr>
                         <m:t>layer</m:t>
                       </m:r>
                       <m:r>
-                        <a:rPr lang="en-US" sz="1000">
+                        <a:rPr lang="en-US" sz="1200">
                           <a:latin typeface="Cambria Math" panose="02040503050406030204" pitchFamily="18" charset="0"/>
                         </a:rPr>
                         <m:t> </m:t>
                       </m:r>
                       <m:r>
-                        <a:rPr lang="en-US" sz="1000" i="1">
+                        <a:rPr lang="en-US" sz="1200" i="1">
                           <a:latin typeface="Cambria Math" panose="02040503050406030204" pitchFamily="18" charset="0"/>
                         </a:rPr>
                         <m:t>𝑙</m:t>
@@ -11305,13 +12690,22 @@
                     </m:oMath>
                   </m:oMathPara>
                 </a14:m>
-                <a:endParaRPr lang="en-US" sz="1000" dirty="0"/>
+                <a:endParaRPr lang="en-US" sz="1200" dirty="0">
+                  <a:latin typeface="Times New Roman" panose="02020603050405020304" pitchFamily="18" charset="0"/>
+                  <a:cs typeface="Times New Roman" panose="02020603050405020304" pitchFamily="18" charset="0"/>
+                </a:endParaRPr>
               </a:p>
               <a:p>
-                <a:endParaRPr lang="en-US" sz="1000" dirty="0"/>
+                <a:endParaRPr lang="en-US" sz="1200" dirty="0">
+                  <a:latin typeface="Times New Roman" panose="02020603050405020304" pitchFamily="18" charset="0"/>
+                  <a:cs typeface="Times New Roman" panose="02020603050405020304" pitchFamily="18" charset="0"/>
+                </a:endParaRPr>
               </a:p>
               <a:p>
-                <a:endParaRPr lang="en-US" sz="1000" dirty="0"/>
+                <a:endParaRPr lang="en-US" sz="1200" dirty="0">
+                  <a:latin typeface="Times New Roman" panose="02020603050405020304" pitchFamily="18" charset="0"/>
+                  <a:cs typeface="Times New Roman" panose="02020603050405020304" pitchFamily="18" charset="0"/>
+                </a:endParaRPr>
               </a:p>
             </p:txBody>
           </p:sp>
@@ -11333,16 +12727,16 @@
             </p:nvSpPr>
             <p:spPr>
               <a:xfrm>
-                <a:off x="223288" y="4913091"/>
-                <a:ext cx="4493855" cy="1175194"/>
+                <a:off x="261237" y="4113223"/>
+                <a:ext cx="3334300" cy="1388329"/>
               </a:xfrm>
               <a:prstGeom prst="rect">
                 <a:avLst/>
               </a:prstGeom>
               <a:blipFill>
-                <a:blip r:embed="rId3"/>
+                <a:blip r:embed="rId4"/>
                 <a:stretch>
-                  <a:fillRect/>
+                  <a:fillRect l="-183" t="-441" r="-58684"/>
                 </a:stretch>
               </a:blipFill>
             </p:spPr>
@@ -11428,7 +12822,7 @@
         <p:spPr>
           <a:xfrm>
             <a:off x="857250" y="1673573"/>
-            <a:ext cx="9588190" cy="4832092"/>
+            <a:ext cx="9588190" cy="4278094"/>
           </a:xfrm>
           <a:prstGeom prst="rect">
             <a:avLst/>
@@ -11480,7 +12874,7 @@
             </a:pPr>
             <a:r>
               <a:rPr lang="en-US" dirty="0"/>
-              <a:t>Supervises only static pixels (dynamic regions ignored during optimization).</a:t>
+              <a:t>Maintains structural integrity</a:t>
             </a:r>
           </a:p>
           <a:p>
@@ -11492,32 +12886,28 @@
               <a:rPr lang="en-US" dirty="0"/>
               <a:t>Simpler to implement.</a:t>
             </a:r>
-            <a:endParaRPr sz="2000" dirty="0"/>
-          </a:p>
-          <a:p>
-            <a:r>
-              <a:rPr sz="2000" dirty="0"/>
-              <a:t>2</a:t>
-            </a:r>
-            <a:r>
-              <a:rPr sz="2000" b="1" dirty="0"/>
-              <a:t>. Ray Filtering </a:t>
-            </a:r>
-            <a:r>
-              <a:rPr sz="2000" dirty="0"/>
-              <a:t>– Discard rays passing through dynamic regions.</a:t>
-            </a:r>
-            <a:endParaRPr lang="en-US" sz="2000" dirty="0"/>
           </a:p>
           <a:p>
             <a:pPr marL="285750" indent="-285750">
               <a:buFont typeface="Arial" panose="020B0604020202020204" pitchFamily="34" charset="0"/>
               <a:buChar char="•"/>
             </a:pPr>
-            <a:r>
-              <a:rPr lang="en-US" sz="2000" dirty="0"/>
-              <a:t>Removes masked rays fully from training</a:t>
-            </a:r>
+            <a:endParaRPr sz="2000" dirty="0"/>
+          </a:p>
+          <a:p>
+            <a:r>
+              <a:rPr sz="2000" dirty="0"/>
+              <a:t>2</a:t>
+            </a:r>
+            <a:r>
+              <a:rPr sz="2000" b="1" dirty="0"/>
+              <a:t>. Ray Filtering </a:t>
+            </a:r>
+            <a:r>
+              <a:rPr sz="2000" dirty="0"/>
+              <a:t>– Discard rays passing through dynamic regions.</a:t>
+            </a:r>
+            <a:endParaRPr lang="en-US" sz="2000" dirty="0"/>
           </a:p>
           <a:p>
             <a:pPr marL="285750" indent="-285750">
@@ -11526,7 +12916,7 @@
             </a:pPr>
             <a:r>
               <a:rPr lang="en-US" sz="2000" dirty="0"/>
-              <a:t>Higher PSNR</a:t>
+              <a:t>Removes masked rays fully from training</a:t>
             </a:r>
           </a:p>
           <a:p>
@@ -11536,7 +12926,7 @@
             </a:pPr>
             <a:r>
               <a:rPr lang="en-US" sz="2000" dirty="0"/>
-              <a:t>Sharper geometry</a:t>
+              <a:t>Higher PSNR</a:t>
             </a:r>
           </a:p>
           <a:p>
@@ -11546,7 +12936,7 @@
             </a:pPr>
             <a:r>
               <a:rPr lang="en-US" sz="2000" dirty="0"/>
-              <a:t>Provides stronger guarantees</a:t>
+              <a:t>Sharper geometry</a:t>
             </a:r>
           </a:p>
           <a:p>
@@ -11554,10 +12944,6 @@
               <a:buFont typeface="Arial" panose="020B0604020202020204" pitchFamily="34" charset="0"/>
               <a:buChar char="•"/>
             </a:pPr>
-            <a:r>
-              <a:rPr lang="en-US" dirty="0"/>
-              <a:t>More complex implementation</a:t>
-            </a:r>
             <a:endParaRPr lang="en-US" sz="2000" dirty="0"/>
           </a:p>
           <a:p>
@@ -11581,7 +12967,7 @@
             </a:pPr>
             <a:r>
               <a:rPr lang="en-US" sz="2000" dirty="0"/>
-              <a:t>uses all pixels from all training images without considering whether the scene parts are dynamic or static.</a:t>
+              <a:t>uses all pixels from all training images</a:t>
             </a:r>
           </a:p>
           <a:p>
@@ -11593,17 +12979,6 @@
               <a:rPr lang="en-US" dirty="0"/>
               <a:t>No mask guidance</a:t>
             </a:r>
-          </a:p>
-          <a:p>
-            <a:pPr marL="342900" indent="-342900">
-              <a:buFont typeface="Arial" panose="020B0604020202020204" pitchFamily="34" charset="0"/>
-              <a:buChar char="•"/>
-            </a:pPr>
-            <a:r>
-              <a:rPr lang="en-US" dirty="0"/>
-              <a:t>Expected to show ghosting and blur on static background</a:t>
-            </a:r>
-            <a:endParaRPr lang="en-US" sz="2000" dirty="0"/>
           </a:p>
           <a:p>
             <a:endParaRPr dirty="0"/>
@@ -11685,6 +13060,36 @@
           </a:p>
         </p:txBody>
       </p:sp>
+      <p:pic>
+        <p:nvPicPr>
+          <p:cNvPr id="7" name="Picture 6">
+            <a:extLst>
+              <a:ext uri="{FF2B5EF4-FFF2-40B4-BE49-F238E27FC236}">
+                <a16:creationId xmlns:a16="http://schemas.microsoft.com/office/drawing/2014/main" id="{FC40B2AA-79FB-4C37-A047-219BF4AF2295}"/>
+              </a:ext>
+            </a:extLst>
+          </p:cNvPr>
+          <p:cNvPicPr>
+            <a:picLocks noChangeAspect="1"/>
+          </p:cNvPicPr>
+          <p:nvPr/>
+        </p:nvPicPr>
+        <p:blipFill>
+          <a:blip r:embed="rId3"/>
+          <a:stretch>
+            <a:fillRect/>
+          </a:stretch>
+        </p:blipFill>
+        <p:spPr>
+          <a:xfrm>
+            <a:off x="538843" y="1754477"/>
+            <a:ext cx="11305495" cy="4792666"/>
+          </a:xfrm>
+          <a:prstGeom prst="rect">
+            <a:avLst/>
+          </a:prstGeom>
+        </p:spPr>
+      </p:pic>
     </p:spTree>
   </p:cSld>
   <p:clrMapOvr>
@@ -11981,8 +13386,8 @@
         </p:nvSpPr>
         <p:spPr>
           <a:xfrm>
-            <a:off x="2819398" y="824170"/>
-            <a:ext cx="6007101" cy="776030"/>
+            <a:off x="3135086" y="824170"/>
+            <a:ext cx="5691413" cy="466734"/>
           </a:xfrm>
         </p:spPr>
         <p:txBody>
@@ -12023,8 +13428,8 @@
         </p:nvSpPr>
         <p:spPr>
           <a:xfrm>
-            <a:off x="457200" y="1600201"/>
-            <a:ext cx="8229600" cy="1600199"/>
+            <a:off x="709840" y="2839115"/>
+            <a:ext cx="4457700" cy="1179770"/>
           </a:xfrm>
           <a:prstGeom prst="rect">
             <a:avLst/>
@@ -12171,7 +13576,7 @@
           </a:lstStyle>
           <a:p>
             <a:r>
-              <a:rPr lang="en-US" sz="2400" dirty="0">
+              <a:rPr lang="en-US" sz="1600" dirty="0">
                 <a:latin typeface="Times New Roman" panose="02020603050405020304" pitchFamily="18" charset="0"/>
                 <a:cs typeface="Times New Roman" panose="02020603050405020304" pitchFamily="18" charset="0"/>
               </a:rPr>
@@ -12180,7 +13585,7 @@
           </a:p>
           <a:p>
             <a:r>
-              <a:rPr lang="en-US" sz="2400" dirty="0">
+              <a:rPr lang="en-US" sz="1600" dirty="0">
                 <a:latin typeface="Times New Roman" panose="02020603050405020304" pitchFamily="18" charset="0"/>
                 <a:cs typeface="Times New Roman" panose="02020603050405020304" pitchFamily="18" charset="0"/>
               </a:rPr>
@@ -12189,7 +13594,7 @@
           </a:p>
           <a:p>
             <a:r>
-              <a:rPr lang="en-US" sz="2400" dirty="0">
+              <a:rPr lang="en-US" sz="1600" dirty="0">
                 <a:latin typeface="Times New Roman" panose="02020603050405020304" pitchFamily="18" charset="0"/>
                 <a:cs typeface="Times New Roman" panose="02020603050405020304" pitchFamily="18" charset="0"/>
               </a:rPr>
@@ -12287,15 +13692,15 @@
           <p:nvPr/>
         </p:nvPicPr>
         <p:blipFill>
-          <a:blip r:embed="rId2"/>
+          <a:blip r:embed="rId3"/>
           <a:stretch>
             <a:fillRect/>
           </a:stretch>
         </p:blipFill>
         <p:spPr>
           <a:xfrm>
-            <a:off x="942975" y="3071813"/>
-            <a:ext cx="7272337" cy="2962017"/>
+            <a:off x="718457" y="1467929"/>
+            <a:ext cx="11201400" cy="5219489"/>
           </a:xfrm>
           <a:prstGeom prst="rect">
             <a:avLst/>
@@ -12316,8 +13721,8 @@
         </p:nvSpPr>
         <p:spPr>
           <a:xfrm>
-            <a:off x="1085850" y="6325672"/>
-            <a:ext cx="9658351" cy="369332"/>
+            <a:off x="2171700" y="6218496"/>
+            <a:ext cx="3396342" cy="276999"/>
           </a:xfrm>
           <a:prstGeom prst="rect">
             <a:avLst/>
@@ -12330,8 +13735,9 @@
           </a:bodyPr>
           <a:lstStyle/>
           <a:p>
-            <a:r>
-              <a:rPr lang="en-US" dirty="0"/>
+            <a:pPr algn="ctr"/>
+            <a:r>
+              <a:rPr lang="en-US" sz="1200" dirty="0"/>
               <a:t>Fig 3.0: Ground Truth vs Masked Images</a:t>
             </a:r>
           </a:p>

</xml_diff>